<commit_message>
Updated IIS and Azure Deployment.pptx
</commit_message>
<xml_diff>
--- a/08. IIS-and-Azure-Deployment/IIS and Azure Deployment.pptx
+++ b/08. IIS-and-Azure-Deployment/IIS and Azure Deployment.pptx
@@ -5,10 +5,10 @@
     <p:sldMasterId id="2147483672" r:id="rId1"/>
   </p:sldMasterIdLst>
   <p:notesMasterIdLst>
-    <p:notesMasterId r:id="rId29"/>
+    <p:notesMasterId r:id="rId26"/>
   </p:notesMasterIdLst>
   <p:handoutMasterIdLst>
-    <p:handoutMasterId r:id="rId30"/>
+    <p:handoutMasterId r:id="rId27"/>
   </p:handoutMasterIdLst>
   <p:sldIdLst>
     <p:sldId id="320" r:id="rId2"/>
@@ -24,20 +24,17 @@
     <p:sldId id="391" r:id="rId12"/>
     <p:sldId id="392" r:id="rId13"/>
     <p:sldId id="393" r:id="rId14"/>
-    <p:sldId id="376" r:id="rId15"/>
-    <p:sldId id="377" r:id="rId16"/>
-    <p:sldId id="388" r:id="rId17"/>
-    <p:sldId id="394" r:id="rId18"/>
-    <p:sldId id="389" r:id="rId19"/>
-    <p:sldId id="381" r:id="rId20"/>
-    <p:sldId id="396" r:id="rId21"/>
-    <p:sldId id="395" r:id="rId22"/>
-    <p:sldId id="382" r:id="rId23"/>
-    <p:sldId id="378" r:id="rId24"/>
-    <p:sldId id="397" r:id="rId25"/>
-    <p:sldId id="334" r:id="rId26"/>
-    <p:sldId id="374" r:id="rId27"/>
-    <p:sldId id="333" r:id="rId28"/>
+    <p:sldId id="398" r:id="rId15"/>
+    <p:sldId id="394" r:id="rId16"/>
+    <p:sldId id="389" r:id="rId17"/>
+    <p:sldId id="381" r:id="rId18"/>
+    <p:sldId id="396" r:id="rId19"/>
+    <p:sldId id="395" r:id="rId20"/>
+    <p:sldId id="382" r:id="rId21"/>
+    <p:sldId id="378" r:id="rId22"/>
+    <p:sldId id="397" r:id="rId23"/>
+    <p:sldId id="334" r:id="rId24"/>
+    <p:sldId id="333" r:id="rId25"/>
   </p:sldIdLst>
   <p:sldSz cx="9144000" cy="6858000" type="screen4x3"/>
   <p:notesSz cx="6881813" cy="9296400"/>
@@ -314,7 +311,7 @@
             <a:fld id="{3BF7C7B5-275F-4D1F-9AB4-9255447DBC73}" type="datetimeFigureOut">
               <a:rPr lang="en-US"/>
               <a:pPr/>
-              <a:t>11/6/2014</a:t>
+              <a:t>2/8/2016</a:t>
             </a:fld>
             <a:endParaRPr lang="en-US" dirty="0"/>
           </a:p>
@@ -545,7 +542,7 @@
             <a:fld id="{9B46F231-FB2B-4655-A644-E2477325E686}" type="datetimeFigureOut">
               <a:rPr lang="en-US"/>
               <a:pPr/>
-              <a:t>11/6/2014</a:t>
+              <a:t>2/8/2016</a:t>
             </a:fld>
             <a:endParaRPr lang="en-US" dirty="0"/>
           </a:p>
@@ -1534,146 +1531,6 @@
     <p:extLst>
       <p:ext uri="{BB962C8B-B14F-4D97-AF65-F5344CB8AC3E}">
         <p14:creationId xmlns:p14="http://schemas.microsoft.com/office/powerpoint/2010/main" val="437901099"/>
-      </p:ext>
-    </p:extLst>
-  </p:cSld>
-  <p:clrMapOvr>
-    <a:masterClrMapping/>
-  </p:clrMapOvr>
-</p:notes>
-</file>
-
-<file path=ppt/notesSlides/notesSlide6.xml><?xml version="1.0" encoding="utf-8"?>
-<p:notes xmlns:a="http://schemas.openxmlformats.org/drawingml/2006/main" xmlns:r="http://schemas.openxmlformats.org/officeDocument/2006/relationships" xmlns:p="http://schemas.openxmlformats.org/presentationml/2006/main">
-  <p:cSld>
-    <p:spTree>
-      <p:nvGrpSpPr>
-        <p:cNvPr id="1" name=""/>
-        <p:cNvGrpSpPr/>
-        <p:nvPr/>
-      </p:nvGrpSpPr>
-      <p:grpSpPr>
-        <a:xfrm>
-          <a:off x="0" y="0"/>
-          <a:ext cx="0" cy="0"/>
-          <a:chOff x="0" y="0"/>
-          <a:chExt cx="0" cy="0"/>
-        </a:xfrm>
-      </p:grpSpPr>
-      <p:sp>
-        <p:nvSpPr>
-          <p:cNvPr id="4" name="Rectangle 2"/>
-          <p:cNvSpPr>
-            <a:spLocks noGrp="1" noChangeArrowheads="1"/>
-          </p:cNvSpPr>
-          <p:nvPr>
-            <p:ph type="hdr" sz="quarter"/>
-          </p:nvPr>
-        </p:nvSpPr>
-        <p:spPr>
-          <a:ln/>
-        </p:spPr>
-        <p:txBody>
-          <a:bodyPr/>
-          <a:lstStyle/>
-          <a:p>
-            <a:r>
-              <a:rPr lang="en-US" dirty="0"/>
-              <a:t>*</a:t>
-            </a:r>
-          </a:p>
-        </p:txBody>
-      </p:sp>
-      <p:sp>
-        <p:nvSpPr>
-          <p:cNvPr id="5" name="Rectangle 6"/>
-          <p:cNvSpPr>
-            <a:spLocks noGrp="1" noChangeArrowheads="1"/>
-          </p:cNvSpPr>
-          <p:nvPr>
-            <p:ph type="ftr" sz="quarter" idx="4"/>
-          </p:nvPr>
-        </p:nvSpPr>
-        <p:spPr>
-          <a:ln/>
-        </p:spPr>
-        <p:txBody>
-          <a:bodyPr/>
-          <a:lstStyle/>
-          <a:p>
-            <a:r>
-              <a:rPr lang="en-US" dirty="0"/>
-              <a:t>(c) 2008 National Academy for Software Development - http://academy.devbg.org. All rights reserved. Unauthorized copying or re-distribution is strictly prohibited.*</a:t>
-            </a:r>
-          </a:p>
-        </p:txBody>
-      </p:sp>
-      <p:sp>
-        <p:nvSpPr>
-          <p:cNvPr id="6" name="Rectangle 7"/>
-          <p:cNvSpPr>
-            <a:spLocks noGrp="1" noChangeArrowheads="1"/>
-          </p:cNvSpPr>
-          <p:nvPr>
-            <p:ph type="sldNum" sz="quarter" idx="5"/>
-          </p:nvPr>
-        </p:nvSpPr>
-        <p:spPr>
-          <a:ln/>
-        </p:spPr>
-        <p:txBody>
-          <a:bodyPr/>
-          <a:lstStyle/>
-          <a:p>
-            <a:fld id="{7E89B841-8A48-48DC-813C-151166E312BA}" type="slidenum">
-              <a:rPr lang="en-US"/>
-              <a:pPr/>
-              <a:t>26</a:t>
-            </a:fld>
-            <a:r>
-              <a:rPr lang="en-US" dirty="0"/>
-              <a:t>##</a:t>
-            </a:r>
-          </a:p>
-        </p:txBody>
-      </p:sp>
-      <p:sp>
-        <p:nvSpPr>
-          <p:cNvPr id="545794" name="Rectangle 2"/>
-          <p:cNvSpPr>
-            <a:spLocks noGrp="1" noRot="1" noChangeAspect="1" noChangeArrowheads="1" noTextEdit="1"/>
-          </p:cNvSpPr>
-          <p:nvPr>
-            <p:ph type="sldImg"/>
-          </p:nvPr>
-        </p:nvSpPr>
-        <p:spPr>
-          <a:ln/>
-        </p:spPr>
-      </p:sp>
-      <p:sp>
-        <p:nvSpPr>
-          <p:cNvPr id="545795" name="Rectangle 3"/>
-          <p:cNvSpPr>
-            <a:spLocks noGrp="1" noChangeArrowheads="1"/>
-          </p:cNvSpPr>
-          <p:nvPr>
-            <p:ph type="body" idx="1"/>
-          </p:nvPr>
-        </p:nvSpPr>
-        <p:spPr/>
-        <p:txBody>
-          <a:bodyPr/>
-          <a:lstStyle/>
-          <a:p>
-            <a:endParaRPr lang="bg-BG"/>
-          </a:p>
-        </p:txBody>
-      </p:sp>
-    </p:spTree>
-    <p:extLst>
-      <p:ext uri="{BB962C8B-B14F-4D97-AF65-F5344CB8AC3E}">
-        <p14:creationId xmlns:p14="http://schemas.microsoft.com/office/powerpoint/2010/main" val="3582086883"/>
       </p:ext>
     </p:extLst>
   </p:cSld>
@@ -6615,8 +6472,8 @@
         </p:nvSpPr>
         <p:spPr>
           <a:xfrm>
-            <a:off x="827266" y="2099534"/>
-            <a:ext cx="7859533" cy="1642732"/>
+            <a:off x="609600" y="2099534"/>
+            <a:ext cx="8077199" cy="1642732"/>
           </a:xfrm>
         </p:spPr>
         <p:txBody>
@@ -6629,8 +6486,23 @@
               </a:lnSpc>
             </a:pPr>
             <a:r>
+              <a:rPr lang="en-US" dirty="0"/>
+              <a:t>IIS and Azure </a:t>
+            </a:r>
+            <a:r>
               <a:rPr lang="en-US" dirty="0" smtClean="0"/>
-              <a:t>IIS and Deployment of ASP.NET Applications</a:t>
+              <a:t>Deployment</a:t>
+            </a:r>
+            <a:br>
+              <a:rPr lang="en-US" dirty="0" smtClean="0"/>
+            </a:br>
+            <a:r>
+              <a:rPr lang="en-US" dirty="0" smtClean="0"/>
+              <a:t>of </a:t>
+            </a:r>
+            <a:r>
+              <a:rPr lang="en-US" dirty="0"/>
+              <a:t>ASP.NET Applications</a:t>
             </a:r>
             <a:endParaRPr lang="bg-BG" dirty="0" smtClean="0"/>
           </a:p>
@@ -6659,7 +6531,7 @@
         </p:blipFill>
         <p:spPr bwMode="auto">
           <a:xfrm>
-            <a:off x="3429000" y="4569607"/>
+            <a:off x="3505200" y="4569605"/>
             <a:ext cx="1652517" cy="1802745"/>
           </a:xfrm>
           <a:prstGeom prst="rect">
@@ -7712,14 +7584,14 @@
       </p:sp>
       <p:pic>
         <p:nvPicPr>
-          <p:cNvPr id="1026" name="Picture 2" descr="http://www.arvixe.com/images/landing_pages/iis85_hosting.png"/>
+          <p:cNvPr id="2" name="Picture 2" descr="http://asphostportal.com/img/icon-iis.png"/>
           <p:cNvPicPr>
             <a:picLocks noChangeAspect="1" noChangeArrowheads="1"/>
           </p:cNvPicPr>
           <p:nvPr/>
         </p:nvPicPr>
         <p:blipFill>
-          <a:blip r:embed="rId10">
+          <a:blip r:embed="rId10" cstate="print">
             <a:extLst>
               <a:ext uri="{28A0092B-C50C-407E-A947-70E740481C1C}">
                 <a14:useLocalDpi xmlns:a14="http://schemas.microsoft.com/office/drawing/2010/main" val="0"/>
@@ -7733,8 +7605,8 @@
         </p:blipFill>
         <p:spPr bwMode="auto">
           <a:xfrm>
-            <a:off x="5974220" y="4267200"/>
-            <a:ext cx="2317514" cy="2317514"/>
+            <a:off x="5679954" y="4676696"/>
+            <a:ext cx="2917772" cy="1588565"/>
           </a:xfrm>
           <a:prstGeom prst="rect">
             <a:avLst/>
@@ -7805,14 +7677,11 @@
           <a:p>
             <a:r>
               <a:rPr lang="en-US" dirty="0" smtClean="0"/>
-              <a:t>Deploying</a:t>
-            </a:r>
-            <a:br>
+              <a:t>Deploying ASP.NET Applications </a:t>
+            </a:r>
+            <a:r>
               <a:rPr lang="en-US" dirty="0" smtClean="0"/>
-            </a:br>
-            <a:r>
-              <a:rPr lang="en-US" dirty="0" smtClean="0"/>
-              <a:t>ASP.NET Apps in IIS</a:t>
+              <a:t>in IIS</a:t>
             </a:r>
             <a:endParaRPr lang="en-US" dirty="0"/>
           </a:p>
@@ -7882,28 +7751,43 @@
       </p:pic>
       <p:pic>
         <p:nvPicPr>
-          <p:cNvPr id="9" name="Picture 8"/>
+          <p:cNvPr id="7" name="Picture 2" descr="http://asphostportal.com/img/icon-iis.png"/>
           <p:cNvPicPr>
-            <a:picLocks noChangeAspect="1"/>
+            <a:picLocks noChangeAspect="1" noChangeArrowheads="1"/>
           </p:cNvPicPr>
           <p:nvPr/>
         </p:nvPicPr>
         <p:blipFill>
-          <a:blip r:embed="rId3"/>
+          <a:blip r:embed="rId3" cstate="print">
+            <a:extLst>
+              <a:ext uri="{28A0092B-C50C-407E-A947-70E740481C1C}">
+                <a14:useLocalDpi xmlns:a14="http://schemas.microsoft.com/office/drawing/2010/main" val="0"/>
+              </a:ext>
+            </a:extLst>
+          </a:blip>
+          <a:srcRect/>
           <a:stretch>
             <a:fillRect/>
           </a:stretch>
         </p:blipFill>
-        <p:spPr>
+        <p:spPr bwMode="auto">
           <a:xfrm>
-            <a:off x="4876799" y="1600200"/>
-            <a:ext cx="3703321" cy="2057400"/>
+            <a:off x="4878183" y="1600199"/>
+            <a:ext cx="3778899" cy="2057401"/>
           </a:xfrm>
-          <a:prstGeom prst="roundRect">
-            <a:avLst>
-              <a:gd name="adj" fmla="val 2422"/>
-            </a:avLst>
+          <a:prstGeom prst="rect">
+            <a:avLst/>
           </a:prstGeom>
+          <a:noFill/>
+          <a:extLst>
+            <a:ext uri="{909E8E84-426E-40DD-AFC4-6F175D3DCCD1}">
+              <a14:hiddenFill xmlns:a14="http://schemas.microsoft.com/office/drawing/2010/main">
+                <a:solidFill>
+                  <a:srgbClr val="FFFFFF"/>
+                </a:solidFill>
+              </a14:hiddenFill>
+            </a:ext>
+          </a:extLst>
         </p:spPr>
       </p:pic>
       <p:pic>
@@ -7927,7 +7811,7 @@
         </p:blipFill>
         <p:spPr bwMode="auto">
           <a:xfrm rot="21177485">
-            <a:off x="2755371" y="870776"/>
+            <a:off x="2654418" y="795611"/>
             <a:ext cx="3093226" cy="1228176"/>
           </a:xfrm>
           <a:prstGeom prst="roundRect">
@@ -8033,7 +7917,7 @@
         </p:nvSpPr>
         <p:spPr>
           <a:xfrm>
-            <a:off x="228600" y="838200"/>
+            <a:off x="228600" y="762000"/>
             <a:ext cx="8686800" cy="5867400"/>
           </a:xfrm>
         </p:spPr>
@@ -8124,25 +8008,7 @@
               <a:rPr lang="en-US" dirty="0" smtClean="0">
                 <a:hlinkClick r:id="rId2"/>
               </a:rPr>
-              <a:t>http</a:t>
-            </a:r>
-            <a:r>
-              <a:rPr lang="en-US" dirty="0" smtClean="0">
-                <a:hlinkClick r:id="rId2"/>
-              </a:rPr>
-              <a:t>://</a:t>
-            </a:r>
-            <a:r>
-              <a:rPr lang="en-US" dirty="0" smtClean="0">
-                <a:hlinkClick r:id="rId2"/>
-              </a:rPr>
-              <a:t>site</a:t>
-            </a:r>
-            <a:r>
-              <a:rPr lang="en-US" dirty="0" smtClean="0">
-                <a:hlinkClick r:id="rId2"/>
-              </a:rPr>
-              <a:t>.com</a:t>
+              <a:t>http://site.com</a:t>
             </a:r>
             <a:r>
               <a:rPr lang="en-US" dirty="0" smtClean="0"/>
@@ -8189,7 +8055,7 @@
       </p:sp>
       <p:pic>
         <p:nvPicPr>
-          <p:cNvPr id="9" name="Picture 8"/>
+          <p:cNvPr id="5" name="Picture 4"/>
           <p:cNvPicPr>
             <a:picLocks noChangeAspect="1"/>
           </p:cNvPicPr>
@@ -8203,8 +8069,8 @@
         </p:blipFill>
         <p:spPr>
           <a:xfrm>
-            <a:off x="522870" y="3870656"/>
-            <a:ext cx="8087730" cy="2606344"/>
+            <a:off x="577734" y="3744799"/>
+            <a:ext cx="7988531" cy="2808401"/>
           </a:xfrm>
           <a:prstGeom prst="rect">
             <a:avLst/>
@@ -8363,7 +8229,7 @@
       </p:sp>
       <p:pic>
         <p:nvPicPr>
-          <p:cNvPr id="5" name="Picture 4"/>
+          <p:cNvPr id="10" name="Picture 9"/>
           <p:cNvPicPr>
             <a:picLocks noChangeAspect="1"/>
           </p:cNvPicPr>
@@ -8377,8 +8243,8 @@
         </p:blipFill>
         <p:spPr>
           <a:xfrm>
-            <a:off x="775536" y="3444136"/>
-            <a:ext cx="7606464" cy="2956664"/>
+            <a:off x="509452" y="3419943"/>
+            <a:ext cx="8125096" cy="2743200"/>
           </a:xfrm>
           <a:prstGeom prst="rect">
             <a:avLst/>
@@ -8387,7 +8253,7 @@
       </p:pic>
       <p:pic>
         <p:nvPicPr>
-          <p:cNvPr id="6" name="Picture 5"/>
+          <p:cNvPr id="9" name="Picture 8"/>
           <p:cNvPicPr>
             <a:picLocks noChangeAspect="1"/>
           </p:cNvPicPr>
@@ -8401,8 +8267,8 @@
         </p:blipFill>
         <p:spPr>
           <a:xfrm>
-            <a:off x="6172200" y="3309289"/>
-            <a:ext cx="2028825" cy="1836215"/>
+            <a:off x="6629400" y="3200400"/>
+            <a:ext cx="2069374" cy="1911774"/>
           </a:xfrm>
           <a:prstGeom prst="rect">
             <a:avLst/>
@@ -8555,7 +8421,7 @@
       </p:sp>
       <p:pic>
         <p:nvPicPr>
-          <p:cNvPr id="5" name="Picture 4"/>
+          <p:cNvPr id="6" name="Picture 5"/>
           <p:cNvPicPr>
             <a:picLocks noChangeAspect="1"/>
           </p:cNvPicPr>
@@ -8569,8 +8435,8 @@
         </p:blipFill>
         <p:spPr>
           <a:xfrm>
-            <a:off x="914399" y="3581400"/>
-            <a:ext cx="7315202" cy="2883956"/>
+            <a:off x="673583" y="3519837"/>
+            <a:ext cx="7796833" cy="3008425"/>
           </a:xfrm>
           <a:prstGeom prst="rect">
             <a:avLst/>
@@ -8631,7 +8497,11 @@
           <a:p>
             <a:r>
               <a:rPr lang="en-US" dirty="0" smtClean="0"/>
-              <a:t>Creating an Application in IIS</a:t>
+              <a:t>Add Website / </a:t>
+            </a:r>
+            <a:r>
+              <a:rPr lang="en-US" dirty="0" err="1" smtClean="0"/>
+              <a:t>Applicaiton</a:t>
             </a:r>
             <a:endParaRPr lang="en-US" dirty="0"/>
           </a:p>
@@ -8668,7 +8538,7 @@
       </p:sp>
       <p:pic>
         <p:nvPicPr>
-          <p:cNvPr id="3" name="Picture 2"/>
+          <p:cNvPr id="5" name="Picture 4"/>
           <p:cNvPicPr>
             <a:picLocks noChangeAspect="1"/>
           </p:cNvPicPr>
@@ -8682,8 +8552,8 @@
         </p:blipFill>
         <p:spPr>
           <a:xfrm>
-            <a:off x="639986" y="1171574"/>
-            <a:ext cx="7873554" cy="5038728"/>
+            <a:off x="1676400" y="1060189"/>
+            <a:ext cx="5757863" cy="5600384"/>
           </a:xfrm>
           <a:prstGeom prst="rect">
             <a:avLst/>
@@ -8693,339 +8563,17 @@
     </p:spTree>
     <p:extLst>
       <p:ext uri="{BB962C8B-B14F-4D97-AF65-F5344CB8AC3E}">
-        <p14:creationId xmlns:p14="http://schemas.microsoft.com/office/powerpoint/2010/main" val="2056967061"/>
+        <p14:creationId xmlns:p14="http://schemas.microsoft.com/office/powerpoint/2010/main" val="2476089758"/>
       </p:ext>
     </p:extLst>
   </p:cSld>
   <p:clrMapOvr>
     <a:masterClrMapping/>
   </p:clrMapOvr>
-  <p:timing>
-    <p:tnLst>
-      <p:par>
-        <p:cTn id="1" dur="indefinite" restart="never" nodeType="tmRoot"/>
-      </p:par>
-    </p:tnLst>
-  </p:timing>
 </p:sld>
 </file>
 
 <file path=ppt/slides/slide15.xml><?xml version="1.0" encoding="utf-8"?>
-<p:sld xmlns:a="http://schemas.openxmlformats.org/drawingml/2006/main" xmlns:r="http://schemas.openxmlformats.org/officeDocument/2006/relationships" xmlns:p="http://schemas.openxmlformats.org/presentationml/2006/main">
-  <p:cSld>
-    <p:spTree>
-      <p:nvGrpSpPr>
-        <p:cNvPr id="1" name=""/>
-        <p:cNvGrpSpPr/>
-        <p:nvPr/>
-      </p:nvGrpSpPr>
-      <p:grpSpPr>
-        <a:xfrm>
-          <a:off x="0" y="0"/>
-          <a:ext cx="0" cy="0"/>
-          <a:chOff x="0" y="0"/>
-          <a:chExt cx="0" cy="0"/>
-        </a:xfrm>
-      </p:grpSpPr>
-      <p:sp>
-        <p:nvSpPr>
-          <p:cNvPr id="2" name="Title 1"/>
-          <p:cNvSpPr>
-            <a:spLocks noGrp="1"/>
-          </p:cNvSpPr>
-          <p:nvPr>
-            <p:ph type="title"/>
-          </p:nvPr>
-        </p:nvSpPr>
-        <p:spPr/>
-        <p:txBody>
-          <a:bodyPr/>
-          <a:lstStyle/>
-          <a:p>
-            <a:r>
-              <a:rPr lang="en-US" sz="3800" dirty="0"/>
-              <a:t>Creating an Application in </a:t>
-            </a:r>
-            <a:r>
-              <a:rPr lang="en-US" sz="3800" dirty="0" smtClean="0"/>
-              <a:t>IIS (2)</a:t>
-            </a:r>
-            <a:endParaRPr lang="en-US" sz="3800" dirty="0"/>
-          </a:p>
-        </p:txBody>
-      </p:sp>
-      <p:sp>
-        <p:nvSpPr>
-          <p:cNvPr id="4" name="Slide Number Placeholder 3"/>
-          <p:cNvSpPr>
-            <a:spLocks noGrp="1"/>
-          </p:cNvSpPr>
-          <p:nvPr>
-            <p:ph type="sldNum" sz="quarter" idx="10"/>
-          </p:nvPr>
-        </p:nvSpPr>
-        <p:spPr/>
-        <p:txBody>
-          <a:bodyPr/>
-          <a:lstStyle/>
-          <a:p>
-            <a:pPr>
-              <a:defRPr/>
-            </a:pPr>
-            <a:fld id="{58452FF4-89E3-4D1B-9927-2DBDC00E58D7}" type="slidenum">
-              <a:rPr lang="en-US" smtClean="0"/>
-              <a:pPr>
-                <a:defRPr/>
-              </a:pPr>
-              <a:t>15</a:t>
-            </a:fld>
-            <a:endParaRPr lang="en-US" dirty="0"/>
-          </a:p>
-        </p:txBody>
-      </p:sp>
-      <p:pic>
-        <p:nvPicPr>
-          <p:cNvPr id="3" name="Picture 2"/>
-          <p:cNvPicPr>
-            <a:picLocks noChangeAspect="1"/>
-          </p:cNvPicPr>
-          <p:nvPr/>
-        </p:nvPicPr>
-        <p:blipFill>
-          <a:blip r:embed="rId2"/>
-          <a:stretch>
-            <a:fillRect/>
-          </a:stretch>
-        </p:blipFill>
-        <p:spPr>
-          <a:xfrm>
-            <a:off x="1083129" y="1219200"/>
-            <a:ext cx="6825342" cy="5029200"/>
-          </a:xfrm>
-          <a:prstGeom prst="rect">
-            <a:avLst/>
-          </a:prstGeom>
-        </p:spPr>
-      </p:pic>
-    </p:spTree>
-    <p:extLst>
-      <p:ext uri="{BB962C8B-B14F-4D97-AF65-F5344CB8AC3E}">
-        <p14:creationId xmlns:p14="http://schemas.microsoft.com/office/powerpoint/2010/main" val="3395007476"/>
-      </p:ext>
-    </p:extLst>
-  </p:cSld>
-  <p:clrMapOvr>
-    <a:masterClrMapping/>
-  </p:clrMapOvr>
-  <p:timing>
-    <p:tnLst>
-      <p:par>
-        <p:cTn id="1" dur="indefinite" restart="never" nodeType="tmRoot"/>
-      </p:par>
-    </p:tnLst>
-  </p:timing>
-</p:sld>
-</file>
-
-<file path=ppt/slides/slide16.xml><?xml version="1.0" encoding="utf-8"?>
-<p:sld xmlns:a="http://schemas.openxmlformats.org/drawingml/2006/main" xmlns:r="http://schemas.openxmlformats.org/officeDocument/2006/relationships" xmlns:p="http://schemas.openxmlformats.org/presentationml/2006/main">
-  <p:cSld>
-    <p:spTree>
-      <p:nvGrpSpPr>
-        <p:cNvPr id="1" name=""/>
-        <p:cNvGrpSpPr/>
-        <p:nvPr/>
-      </p:nvGrpSpPr>
-      <p:grpSpPr>
-        <a:xfrm>
-          <a:off x="0" y="0"/>
-          <a:ext cx="0" cy="0"/>
-          <a:chOff x="0" y="0"/>
-          <a:chExt cx="0" cy="0"/>
-        </a:xfrm>
-      </p:grpSpPr>
-      <p:sp>
-        <p:nvSpPr>
-          <p:cNvPr id="2" name="Title 1"/>
-          <p:cNvSpPr>
-            <a:spLocks noGrp="1"/>
-          </p:cNvSpPr>
-          <p:nvPr>
-            <p:ph type="title"/>
-          </p:nvPr>
-        </p:nvSpPr>
-        <p:spPr/>
-        <p:txBody>
-          <a:bodyPr/>
-          <a:lstStyle/>
-          <a:p>
-            <a:r>
-              <a:rPr lang="en-US" sz="3800" dirty="0"/>
-              <a:t>Creating an Application in IIS </a:t>
-            </a:r>
-            <a:r>
-              <a:rPr lang="en-US" sz="3800" dirty="0" smtClean="0"/>
-              <a:t>(3)</a:t>
-            </a:r>
-            <a:endParaRPr lang="en-US" sz="3800" dirty="0"/>
-          </a:p>
-        </p:txBody>
-      </p:sp>
-      <p:sp>
-        <p:nvSpPr>
-          <p:cNvPr id="4" name="Slide Number Placeholder 3"/>
-          <p:cNvSpPr>
-            <a:spLocks noGrp="1"/>
-          </p:cNvSpPr>
-          <p:nvPr>
-            <p:ph type="sldNum" sz="quarter" idx="10"/>
-          </p:nvPr>
-        </p:nvSpPr>
-        <p:spPr/>
-        <p:txBody>
-          <a:bodyPr/>
-          <a:lstStyle/>
-          <a:p>
-            <a:pPr>
-              <a:defRPr/>
-            </a:pPr>
-            <a:fld id="{58452FF4-89E3-4D1B-9927-2DBDC00E58D7}" type="slidenum">
-              <a:rPr lang="en-US" smtClean="0"/>
-              <a:pPr>
-                <a:defRPr/>
-              </a:pPr>
-              <a:t>16</a:t>
-            </a:fld>
-            <a:endParaRPr lang="en-US" dirty="0"/>
-          </a:p>
-        </p:txBody>
-      </p:sp>
-      <p:grpSp>
-        <p:nvGrpSpPr>
-          <p:cNvPr id="15" name="Group 14"/>
-          <p:cNvGrpSpPr/>
-          <p:nvPr/>
-        </p:nvGrpSpPr>
-        <p:grpSpPr>
-          <a:xfrm>
-            <a:off x="447675" y="1345029"/>
-            <a:ext cx="8239125" cy="4369971"/>
-            <a:chOff x="295275" y="950496"/>
-            <a:chExt cx="8620125" cy="4562475"/>
-          </a:xfrm>
-        </p:grpSpPr>
-        <p:pic>
-          <p:nvPicPr>
-            <p:cNvPr id="5" name="Picture 4"/>
-            <p:cNvPicPr>
-              <a:picLocks noChangeAspect="1"/>
-            </p:cNvPicPr>
-            <p:nvPr/>
-          </p:nvPicPr>
-          <p:blipFill>
-            <a:blip r:embed="rId2"/>
-            <a:stretch>
-              <a:fillRect/>
-            </a:stretch>
-          </p:blipFill>
-          <p:spPr>
-            <a:xfrm>
-              <a:off x="295275" y="950496"/>
-              <a:ext cx="8620125" cy="4562475"/>
-            </a:xfrm>
-            <a:prstGeom prst="rect">
-              <a:avLst/>
-            </a:prstGeom>
-          </p:spPr>
-        </p:pic>
-        <p:pic>
-          <p:nvPicPr>
-            <p:cNvPr id="6" name="Picture 5"/>
-            <p:cNvPicPr>
-              <a:picLocks noChangeAspect="1"/>
-            </p:cNvPicPr>
-            <p:nvPr/>
-          </p:nvPicPr>
-          <p:blipFill>
-            <a:blip r:embed="rId3"/>
-            <a:stretch>
-              <a:fillRect/>
-            </a:stretch>
-          </p:blipFill>
-          <p:spPr>
-            <a:xfrm>
-              <a:off x="4572000" y="1343527"/>
-              <a:ext cx="4162425" cy="1819275"/>
-            </a:xfrm>
-            <a:prstGeom prst="rect">
-              <a:avLst/>
-            </a:prstGeom>
-            <a:effectLst>
-              <a:outerShdw blurRad="63500" sx="102000" sy="102000" algn="ctr" rotWithShape="0">
-                <a:prstClr val="black">
-                  <a:alpha val="40000"/>
-                </a:prstClr>
-              </a:outerShdw>
-            </a:effectLst>
-          </p:spPr>
-        </p:pic>
-        <p:cxnSp>
-          <p:nvCxnSpPr>
-            <p:cNvPr id="8" name="Straight Arrow Connector 7"/>
-            <p:cNvCxnSpPr>
-              <a:endCxn id="6" idx="1"/>
-            </p:cNvCxnSpPr>
-            <p:nvPr/>
-          </p:nvCxnSpPr>
-          <p:spPr>
-            <a:xfrm rot="5400000" flipH="1" flipV="1">
-              <a:off x="3368467" y="2618499"/>
-              <a:ext cx="1568867" cy="838200"/>
-            </a:xfrm>
-            <a:prstGeom prst="bentConnector2">
-              <a:avLst/>
-            </a:prstGeom>
-            <a:ln w="41275">
-              <a:tailEnd type="triangle"/>
-            </a:ln>
-          </p:spPr>
-          <p:style>
-            <a:lnRef idx="2">
-              <a:schemeClr val="accent6"/>
-            </a:lnRef>
-            <a:fillRef idx="0">
-              <a:schemeClr val="accent6"/>
-            </a:fillRef>
-            <a:effectRef idx="1">
-              <a:schemeClr val="accent6"/>
-            </a:effectRef>
-            <a:fontRef idx="minor">
-              <a:schemeClr val="tx1"/>
-            </a:fontRef>
-          </p:style>
-        </p:cxnSp>
-      </p:grpSp>
-    </p:spTree>
-    <p:extLst>
-      <p:ext uri="{BB962C8B-B14F-4D97-AF65-F5344CB8AC3E}">
-        <p14:creationId xmlns:p14="http://schemas.microsoft.com/office/powerpoint/2010/main" val="848858930"/>
-      </p:ext>
-    </p:extLst>
-  </p:cSld>
-  <p:clrMapOvr>
-    <a:masterClrMapping/>
-  </p:clrMapOvr>
-  <p:timing>
-    <p:tnLst>
-      <p:par>
-        <p:cTn id="1" dur="indefinite" restart="never" nodeType="tmRoot"/>
-      </p:par>
-    </p:tnLst>
-  </p:timing>
-</p:sld>
-</file>
-
-<file path=ppt/slides/slide17.xml><?xml version="1.0" encoding="utf-8"?>
 <p:sld xmlns:a="http://schemas.openxmlformats.org/drawingml/2006/main" xmlns:r="http://schemas.openxmlformats.org/officeDocument/2006/relationships" xmlns:p="http://schemas.openxmlformats.org/presentationml/2006/main">
   <p:cSld>
     <p:spTree>
@@ -9258,50 +8806,755 @@
       </p:pic>
       <p:pic>
         <p:nvPicPr>
-          <p:cNvPr id="9" name="Picture 8"/>
+          <p:cNvPr id="11" name="Picture 2" descr="http://asphostportal.com/img/icon-iis.png"/>
           <p:cNvPicPr>
-            <a:picLocks noChangeAspect="1"/>
+            <a:picLocks noChangeAspect="1" noChangeArrowheads="1"/>
           </p:cNvPicPr>
           <p:nvPr/>
         </p:nvPicPr>
-        <p:blipFill>
-          <a:blip r:embed="rId5" cstate="screen">
+        <p:blipFill rotWithShape="1">
+          <a:blip r:embed="rId5" cstate="print">
             <a:extLst>
               <a:ext uri="{28A0092B-C50C-407E-A947-70E740481C1C}">
-                <a14:useLocalDpi xmlns:a14="http://schemas.microsoft.com/office/drawing/2010/main"/>
+                <a14:useLocalDpi xmlns:a14="http://schemas.microsoft.com/office/drawing/2010/main" val="0"/>
               </a:ext>
             </a:extLst>
           </a:blip>
-          <a:stretch>
-            <a:fillRect/>
-          </a:stretch>
+          <a:srcRect l="10996" t="16958" r="10362" b="16375"/>
+          <a:stretch/>
         </p:blipFill>
-        <p:spPr>
+        <p:spPr bwMode="auto">
           <a:xfrm>
-            <a:off x="5791200" y="2663690"/>
-            <a:ext cx="2425168" cy="1347315"/>
+            <a:off x="5452534" y="2700251"/>
+            <a:ext cx="2971800" cy="1371600"/>
           </a:xfrm>
-          <a:prstGeom prst="roundRect">
-            <a:avLst>
-              <a:gd name="adj" fmla="val 2632"/>
-            </a:avLst>
+          <a:prstGeom prst="rect">
+            <a:avLst/>
           </a:prstGeom>
-          <a:solidFill>
-            <a:srgbClr val="FFFFFF"/>
-          </a:solidFill>
-          <a:effectLst>
-            <a:outerShdw blurRad="63500" sx="102000" sy="102000" algn="ctr" rotWithShape="0">
-              <a:prstClr val="black">
-                <a:alpha val="40000"/>
-              </a:prstClr>
-            </a:outerShdw>
-          </a:effectLst>
+          <a:noFill/>
+          <a:extLst>
+            <a:ext uri="{909E8E84-426E-40DD-AFC4-6F175D3DCCD1}">
+              <a14:hiddenFill xmlns:a14="http://schemas.microsoft.com/office/drawing/2010/main">
+                <a:solidFill>
+                  <a:srgbClr val="FFFFFF"/>
+                </a:solidFill>
+              </a14:hiddenFill>
+            </a:ext>
+          </a:extLst>
         </p:spPr>
       </p:pic>
     </p:spTree>
     <p:extLst>
       <p:ext uri="{BB962C8B-B14F-4D97-AF65-F5344CB8AC3E}">
         <p14:creationId xmlns:p14="http://schemas.microsoft.com/office/powerpoint/2010/main" val="3562173238"/>
+      </p:ext>
+    </p:extLst>
+  </p:cSld>
+  <p:clrMapOvr>
+    <a:masterClrMapping/>
+  </p:clrMapOvr>
+  <p:timing>
+    <p:tnLst>
+      <p:par>
+        <p:cTn id="1" dur="indefinite" restart="never" nodeType="tmRoot"/>
+      </p:par>
+    </p:tnLst>
+  </p:timing>
+</p:sld>
+</file>
+
+<file path=ppt/slides/slide16.xml><?xml version="1.0" encoding="utf-8"?>
+<p:sld xmlns:a="http://schemas.openxmlformats.org/drawingml/2006/main" xmlns:r="http://schemas.openxmlformats.org/officeDocument/2006/relationships" xmlns:p="http://schemas.openxmlformats.org/presentationml/2006/main">
+  <p:cSld>
+    <p:spTree>
+      <p:nvGrpSpPr>
+        <p:cNvPr id="1" name=""/>
+        <p:cNvGrpSpPr/>
+        <p:nvPr/>
+      </p:nvGrpSpPr>
+      <p:grpSpPr>
+        <a:xfrm>
+          <a:off x="0" y="0"/>
+          <a:ext cx="0" cy="0"/>
+          <a:chOff x="0" y="0"/>
+          <a:chExt cx="0" cy="0"/>
+        </a:xfrm>
+      </p:grpSpPr>
+      <p:sp>
+        <p:nvSpPr>
+          <p:cNvPr id="2" name="Title 1"/>
+          <p:cNvSpPr>
+            <a:spLocks noGrp="1"/>
+          </p:cNvSpPr>
+          <p:nvPr>
+            <p:ph type="title"/>
+          </p:nvPr>
+        </p:nvSpPr>
+        <p:spPr/>
+        <p:txBody>
+          <a:bodyPr/>
+          <a:lstStyle/>
+          <a:p>
+            <a:r>
+              <a:rPr lang="en-US" dirty="0" smtClean="0"/>
+              <a:t>What Files to Deploy?</a:t>
+            </a:r>
+            <a:endParaRPr lang="en-US" dirty="0"/>
+          </a:p>
+        </p:txBody>
+      </p:sp>
+      <p:sp>
+        <p:nvSpPr>
+          <p:cNvPr id="3" name="Content Placeholder 2"/>
+          <p:cNvSpPr>
+            <a:spLocks noGrp="1"/>
+          </p:cNvSpPr>
+          <p:nvPr>
+            <p:ph idx="1"/>
+          </p:nvPr>
+        </p:nvSpPr>
+        <p:spPr>
+          <a:xfrm>
+            <a:off x="228600" y="990600"/>
+            <a:ext cx="8686800" cy="5715000"/>
+          </a:xfrm>
+        </p:spPr>
+        <p:txBody>
+          <a:bodyPr/>
+          <a:lstStyle/>
+          <a:p>
+            <a:r>
+              <a:rPr lang="en-US" dirty="0"/>
+              <a:t>Files to copy to the IIS application directory</a:t>
+            </a:r>
+            <a:r>
+              <a:rPr lang="en-US" dirty="0" smtClean="0"/>
+              <a:t>:</a:t>
+            </a:r>
+          </a:p>
+          <a:p>
+            <a:pPr lvl="1"/>
+            <a:r>
+              <a:rPr lang="en-US" dirty="0" smtClean="0"/>
+              <a:t>Pages &amp; controls: </a:t>
+            </a:r>
+            <a:r>
+              <a:rPr lang="en-US" noProof="1">
+                <a:solidFill>
+                  <a:schemeClr val="accent5">
+                    <a:lumMod val="20000"/>
+                    <a:lumOff val="80000"/>
+                  </a:schemeClr>
+                </a:solidFill>
+                <a:latin typeface="Consolas" panose="020B0609020204030204" pitchFamily="49" charset="0"/>
+                <a:cs typeface="Consolas" panose="020B0609020204030204" pitchFamily="49" charset="0"/>
+              </a:rPr>
+              <a:t>*.</a:t>
+            </a:r>
+            <a:r>
+              <a:rPr lang="en-US" noProof="1" smtClean="0">
+                <a:solidFill>
+                  <a:schemeClr val="accent5">
+                    <a:lumMod val="20000"/>
+                    <a:lumOff val="80000"/>
+                  </a:schemeClr>
+                </a:solidFill>
+                <a:latin typeface="Consolas" panose="020B0609020204030204" pitchFamily="49" charset="0"/>
+                <a:cs typeface="Consolas" panose="020B0609020204030204" pitchFamily="49" charset="0"/>
+              </a:rPr>
+              <a:t>aspx</a:t>
+            </a:r>
+            <a:r>
+              <a:rPr lang="en-US" dirty="0" smtClean="0"/>
+              <a:t>, </a:t>
+            </a:r>
+            <a:r>
+              <a:rPr lang="en-US" noProof="1" smtClean="0">
+                <a:solidFill>
+                  <a:schemeClr val="accent5">
+                    <a:lumMod val="20000"/>
+                    <a:lumOff val="80000"/>
+                  </a:schemeClr>
+                </a:solidFill>
+                <a:latin typeface="Consolas" panose="020B0609020204030204" pitchFamily="49" charset="0"/>
+                <a:cs typeface="Consolas" panose="020B0609020204030204" pitchFamily="49" charset="0"/>
+              </a:rPr>
+              <a:t>*.Master</a:t>
+            </a:r>
+            <a:r>
+              <a:rPr lang="en-US" dirty="0" smtClean="0"/>
+              <a:t>, </a:t>
+            </a:r>
+            <a:r>
+              <a:rPr lang="en-US" noProof="1" smtClean="0">
+                <a:solidFill>
+                  <a:schemeClr val="accent5">
+                    <a:lumMod val="20000"/>
+                    <a:lumOff val="80000"/>
+                  </a:schemeClr>
+                </a:solidFill>
+                <a:latin typeface="Consolas" panose="020B0609020204030204" pitchFamily="49" charset="0"/>
+                <a:cs typeface="Consolas" panose="020B0609020204030204" pitchFamily="49" charset="0"/>
+              </a:rPr>
+              <a:t>*.ascx</a:t>
+            </a:r>
+          </a:p>
+          <a:p>
+            <a:pPr lvl="1"/>
+            <a:r>
+              <a:rPr lang="en-US" dirty="0" smtClean="0"/>
+              <a:t>Resources: </a:t>
+            </a:r>
+            <a:r>
+              <a:rPr lang="en-US" noProof="1" smtClean="0">
+                <a:solidFill>
+                  <a:schemeClr val="accent5">
+                    <a:lumMod val="20000"/>
+                    <a:lumOff val="80000"/>
+                  </a:schemeClr>
+                </a:solidFill>
+                <a:latin typeface="Consolas" panose="020B0609020204030204" pitchFamily="49" charset="0"/>
+                <a:cs typeface="Consolas" panose="020B0609020204030204" pitchFamily="49" charset="0"/>
+              </a:rPr>
+              <a:t>*.jpg</a:t>
+            </a:r>
+            <a:r>
+              <a:rPr lang="en-US" dirty="0" smtClean="0"/>
+              <a:t>, </a:t>
+            </a:r>
+            <a:r>
+              <a:rPr lang="en-US" noProof="1" smtClean="0">
+                <a:solidFill>
+                  <a:schemeClr val="accent5">
+                    <a:lumMod val="20000"/>
+                    <a:lumOff val="80000"/>
+                  </a:schemeClr>
+                </a:solidFill>
+                <a:latin typeface="Consolas" panose="020B0609020204030204" pitchFamily="49" charset="0"/>
+                <a:cs typeface="Consolas" panose="020B0609020204030204" pitchFamily="49" charset="0"/>
+              </a:rPr>
+              <a:t>*.png</a:t>
+            </a:r>
+            <a:r>
+              <a:rPr lang="en-US" dirty="0" smtClean="0"/>
+              <a:t>,</a:t>
+            </a:r>
+            <a:r>
+              <a:rPr lang="en-US" dirty="0"/>
+              <a:t> </a:t>
+            </a:r>
+            <a:r>
+              <a:rPr lang="en-US" noProof="1" smtClean="0">
+                <a:solidFill>
+                  <a:schemeClr val="accent5">
+                    <a:lumMod val="20000"/>
+                    <a:lumOff val="80000"/>
+                  </a:schemeClr>
+                </a:solidFill>
+                <a:latin typeface="Consolas" panose="020B0609020204030204" pitchFamily="49" charset="0"/>
+                <a:cs typeface="Consolas" panose="020B0609020204030204" pitchFamily="49" charset="0"/>
+              </a:rPr>
+              <a:t>*.gif</a:t>
+            </a:r>
+            <a:r>
+              <a:rPr lang="en-US" dirty="0"/>
+              <a:t> , </a:t>
+            </a:r>
+            <a:r>
+              <a:rPr lang="en-US" noProof="1" smtClean="0">
+                <a:solidFill>
+                  <a:schemeClr val="accent5">
+                    <a:lumMod val="20000"/>
+                    <a:lumOff val="80000"/>
+                  </a:schemeClr>
+                </a:solidFill>
+                <a:latin typeface="Consolas" panose="020B0609020204030204" pitchFamily="49" charset="0"/>
+                <a:cs typeface="Consolas" panose="020B0609020204030204" pitchFamily="49" charset="0"/>
+              </a:rPr>
+              <a:t>*.css</a:t>
+            </a:r>
+            <a:r>
+              <a:rPr lang="en-US" dirty="0" smtClean="0"/>
+              <a:t>, </a:t>
+            </a:r>
+            <a:r>
+              <a:rPr lang="en-US" noProof="1">
+                <a:solidFill>
+                  <a:schemeClr val="accent5">
+                    <a:lumMod val="20000"/>
+                    <a:lumOff val="80000"/>
+                  </a:schemeClr>
+                </a:solidFill>
+                <a:latin typeface="Consolas" panose="020B0609020204030204" pitchFamily="49" charset="0"/>
+                <a:cs typeface="Consolas" panose="020B0609020204030204" pitchFamily="49" charset="0"/>
+              </a:rPr>
+              <a:t>*.js</a:t>
+            </a:r>
+            <a:endParaRPr lang="en-US" dirty="0" smtClean="0"/>
+          </a:p>
+          <a:p>
+            <a:pPr lvl="1"/>
+            <a:r>
+              <a:rPr lang="en-US" dirty="0" smtClean="0"/>
+              <a:t>Compiled C# files: </a:t>
+            </a:r>
+            <a:r>
+              <a:rPr lang="en-US" noProof="1" smtClean="0">
+                <a:solidFill>
+                  <a:schemeClr val="accent5">
+                    <a:lumMod val="20000"/>
+                    <a:lumOff val="80000"/>
+                  </a:schemeClr>
+                </a:solidFill>
+                <a:latin typeface="Consolas" panose="020B0609020204030204" pitchFamily="49" charset="0"/>
+                <a:cs typeface="Consolas" panose="020B0609020204030204" pitchFamily="49" charset="0"/>
+              </a:rPr>
+              <a:t>bin\*.dll</a:t>
+            </a:r>
+          </a:p>
+          <a:p>
+            <a:pPr lvl="1"/>
+            <a:r>
+              <a:rPr lang="en-US" dirty="0" smtClean="0"/>
+              <a:t>Config </a:t>
+            </a:r>
+            <a:r>
+              <a:rPr lang="en-US" dirty="0"/>
+              <a:t>files: </a:t>
+            </a:r>
+            <a:r>
+              <a:rPr lang="en-US" noProof="1">
+                <a:solidFill>
+                  <a:schemeClr val="accent5">
+                    <a:lumMod val="20000"/>
+                    <a:lumOff val="80000"/>
+                  </a:schemeClr>
+                </a:solidFill>
+                <a:latin typeface="Consolas" panose="020B0609020204030204" pitchFamily="49" charset="0"/>
+                <a:cs typeface="Consolas" panose="020B0609020204030204" pitchFamily="49" charset="0"/>
+              </a:rPr>
+              <a:t>Web.config</a:t>
+            </a:r>
+            <a:r>
+              <a:rPr lang="en-US" dirty="0"/>
+              <a:t>, </a:t>
+            </a:r>
+            <a:r>
+              <a:rPr lang="en-US" noProof="1">
+                <a:solidFill>
+                  <a:schemeClr val="accent5">
+                    <a:lumMod val="20000"/>
+                    <a:lumOff val="80000"/>
+                  </a:schemeClr>
+                </a:solidFill>
+                <a:latin typeface="Consolas" panose="020B0609020204030204" pitchFamily="49" charset="0"/>
+                <a:cs typeface="Consolas" panose="020B0609020204030204" pitchFamily="49" charset="0"/>
+              </a:rPr>
+              <a:t>Global.asax</a:t>
+            </a:r>
+          </a:p>
+          <a:p>
+            <a:pPr>
+              <a:spcBef>
+                <a:spcPts val="1200"/>
+              </a:spcBef>
+            </a:pPr>
+            <a:r>
+              <a:rPr lang="en-US" dirty="0" smtClean="0"/>
+              <a:t>Don't deploy these files:</a:t>
+            </a:r>
+          </a:p>
+          <a:p>
+            <a:pPr lvl="1"/>
+            <a:r>
+              <a:rPr lang="en-US" dirty="0" smtClean="0"/>
+              <a:t>Source code: </a:t>
+            </a:r>
+            <a:r>
+              <a:rPr lang="en-US" noProof="1" smtClean="0">
+                <a:solidFill>
+                  <a:schemeClr val="accent5">
+                    <a:lumMod val="20000"/>
+                    <a:lumOff val="80000"/>
+                  </a:schemeClr>
+                </a:solidFill>
+                <a:latin typeface="Consolas" panose="020B0609020204030204" pitchFamily="49" charset="0"/>
+                <a:cs typeface="Consolas" panose="020B0609020204030204" pitchFamily="49" charset="0"/>
+              </a:rPr>
+              <a:t>*.cs</a:t>
+            </a:r>
+            <a:r>
+              <a:rPr lang="en-US" dirty="0" smtClean="0"/>
+              <a:t>, </a:t>
+            </a:r>
+            <a:r>
+              <a:rPr lang="en-US" noProof="1" smtClean="0">
+                <a:solidFill>
+                  <a:schemeClr val="accent5">
+                    <a:lumMod val="20000"/>
+                    <a:lumOff val="80000"/>
+                  </a:schemeClr>
+                </a:solidFill>
+                <a:latin typeface="Consolas" panose="020B0609020204030204" pitchFamily="49" charset="0"/>
+                <a:cs typeface="Consolas" panose="020B0609020204030204" pitchFamily="49" charset="0"/>
+              </a:rPr>
+              <a:t>*.csproj</a:t>
+            </a:r>
+            <a:r>
+              <a:rPr lang="en-US" dirty="0" smtClean="0"/>
+              <a:t>, </a:t>
+            </a:r>
+            <a:r>
+              <a:rPr lang="en-US" noProof="1" smtClean="0">
+                <a:solidFill>
+                  <a:schemeClr val="accent5">
+                    <a:lumMod val="20000"/>
+                    <a:lumOff val="80000"/>
+                  </a:schemeClr>
+                </a:solidFill>
+                <a:latin typeface="Consolas" panose="020B0609020204030204" pitchFamily="49" charset="0"/>
+                <a:cs typeface="Consolas" panose="020B0609020204030204" pitchFamily="49" charset="0"/>
+              </a:rPr>
+              <a:t>*.sln</a:t>
+            </a:r>
+          </a:p>
+          <a:p>
+            <a:pPr lvl="1"/>
+            <a:r>
+              <a:rPr lang="en-US" dirty="0" smtClean="0"/>
+              <a:t>Databases: </a:t>
+            </a:r>
+            <a:r>
+              <a:rPr lang="en-US" noProof="1" smtClean="0">
+                <a:solidFill>
+                  <a:schemeClr val="accent5">
+                    <a:lumMod val="20000"/>
+                    <a:lumOff val="80000"/>
+                  </a:schemeClr>
+                </a:solidFill>
+                <a:latin typeface="Consolas" panose="020B0609020204030204" pitchFamily="49" charset="0"/>
+                <a:cs typeface="Consolas" panose="020B0609020204030204" pitchFamily="49" charset="0"/>
+              </a:rPr>
+              <a:t>*.mdf</a:t>
+            </a:r>
+            <a:r>
+              <a:rPr lang="en-US" dirty="0" smtClean="0"/>
+              <a:t> / </a:t>
+            </a:r>
+            <a:r>
+              <a:rPr lang="en-US" noProof="1" smtClean="0">
+                <a:solidFill>
+                  <a:schemeClr val="accent5">
+                    <a:lumMod val="20000"/>
+                    <a:lumOff val="80000"/>
+                  </a:schemeClr>
+                </a:solidFill>
+                <a:latin typeface="Consolas" panose="020B0609020204030204" pitchFamily="49" charset="0"/>
+                <a:cs typeface="Consolas" panose="020B0609020204030204" pitchFamily="49" charset="0"/>
+              </a:rPr>
+              <a:t>*.ldf</a:t>
+            </a:r>
+            <a:r>
+              <a:rPr lang="en-US" dirty="0" smtClean="0"/>
+              <a:t> (deploy separately)</a:t>
+            </a:r>
+            <a:endParaRPr lang="en-US" dirty="0"/>
+          </a:p>
+        </p:txBody>
+      </p:sp>
+      <p:sp>
+        <p:nvSpPr>
+          <p:cNvPr id="4" name="Slide Number Placeholder 3"/>
+          <p:cNvSpPr>
+            <a:spLocks noGrp="1"/>
+          </p:cNvSpPr>
+          <p:nvPr>
+            <p:ph type="sldNum" sz="quarter" idx="10"/>
+          </p:nvPr>
+        </p:nvSpPr>
+        <p:spPr/>
+        <p:txBody>
+          <a:bodyPr/>
+          <a:lstStyle/>
+          <a:p>
+            <a:pPr>
+              <a:defRPr/>
+            </a:pPr>
+            <a:fld id="{58452FF4-89E3-4D1B-9927-2DBDC00E58D7}" type="slidenum">
+              <a:rPr lang="en-US" smtClean="0"/>
+              <a:pPr>
+                <a:defRPr/>
+              </a:pPr>
+              <a:t>16</a:t>
+            </a:fld>
+            <a:endParaRPr lang="en-US" dirty="0"/>
+          </a:p>
+        </p:txBody>
+      </p:sp>
+    </p:spTree>
+    <p:extLst>
+      <p:ext uri="{BB962C8B-B14F-4D97-AF65-F5344CB8AC3E}">
+        <p14:creationId xmlns:p14="http://schemas.microsoft.com/office/powerpoint/2010/main" val="983068792"/>
+      </p:ext>
+    </p:extLst>
+  </p:cSld>
+  <p:clrMapOvr>
+    <a:masterClrMapping/>
+  </p:clrMapOvr>
+  <p:timing>
+    <p:tnLst>
+      <p:par>
+        <p:cTn id="1" dur="indefinite" restart="never" nodeType="tmRoot"/>
+      </p:par>
+    </p:tnLst>
+  </p:timing>
+</p:sld>
+</file>
+
+<file path=ppt/slides/slide17.xml><?xml version="1.0" encoding="utf-8"?>
+<p:sld xmlns:a="http://schemas.openxmlformats.org/drawingml/2006/main" xmlns:r="http://schemas.openxmlformats.org/officeDocument/2006/relationships" xmlns:p="http://schemas.openxmlformats.org/presentationml/2006/main">
+  <p:cSld>
+    <p:spTree>
+      <p:nvGrpSpPr>
+        <p:cNvPr id="1" name=""/>
+        <p:cNvGrpSpPr/>
+        <p:nvPr/>
+      </p:nvGrpSpPr>
+      <p:grpSpPr>
+        <a:xfrm>
+          <a:off x="0" y="0"/>
+          <a:ext cx="0" cy="0"/>
+          <a:chOff x="0" y="0"/>
+          <a:chExt cx="0" cy="0"/>
+        </a:xfrm>
+      </p:grpSpPr>
+      <p:sp>
+        <p:nvSpPr>
+          <p:cNvPr id="2" name="Title 1"/>
+          <p:cNvSpPr>
+            <a:spLocks noGrp="1"/>
+          </p:cNvSpPr>
+          <p:nvPr>
+            <p:ph type="title"/>
+          </p:nvPr>
+        </p:nvSpPr>
+        <p:spPr>
+          <a:xfrm>
+            <a:off x="1828800" y="228600"/>
+            <a:ext cx="7086600" cy="838200"/>
+          </a:xfrm>
+        </p:spPr>
+        <p:txBody>
+          <a:bodyPr/>
+          <a:lstStyle/>
+          <a:p>
+            <a:r>
+              <a:rPr lang="en-US" dirty="0" smtClean="0"/>
+              <a:t>Configuring Database Permissions</a:t>
+            </a:r>
+            <a:r>
+              <a:rPr lang="bg-BG" dirty="0" smtClean="0"/>
+              <a:t> </a:t>
+            </a:r>
+            <a:r>
+              <a:rPr lang="en-US" dirty="0" smtClean="0"/>
+              <a:t>for SQL Server</a:t>
+            </a:r>
+            <a:endParaRPr lang="en-US" dirty="0"/>
+          </a:p>
+        </p:txBody>
+      </p:sp>
+      <p:sp>
+        <p:nvSpPr>
+          <p:cNvPr id="3" name="Content Placeholder 2"/>
+          <p:cNvSpPr>
+            <a:spLocks noGrp="1"/>
+          </p:cNvSpPr>
+          <p:nvPr>
+            <p:ph idx="1"/>
+          </p:nvPr>
+        </p:nvSpPr>
+        <p:spPr>
+          <a:xfrm>
+            <a:off x="228600" y="1371600"/>
+            <a:ext cx="8686800" cy="5334000"/>
+          </a:xfrm>
+        </p:spPr>
+        <p:txBody>
+          <a:bodyPr/>
+          <a:lstStyle/>
+          <a:p>
+            <a:r>
+              <a:rPr lang="en-US" dirty="0" smtClean="0"/>
+              <a:t>Typically in </a:t>
+            </a:r>
+            <a:r>
+              <a:rPr lang="en-US" dirty="0"/>
+              <a:t>IIS your application runs under the </a:t>
+            </a:r>
+            <a:r>
+              <a:rPr lang="en-US" dirty="0" smtClean="0"/>
+              <a:t>user "</a:t>
+            </a:r>
+            <a:r>
+              <a:rPr lang="en-US" noProof="1" smtClean="0">
+                <a:solidFill>
+                  <a:schemeClr val="accent5">
+                    <a:lumMod val="20000"/>
+                    <a:lumOff val="80000"/>
+                  </a:schemeClr>
+                </a:solidFill>
+                <a:latin typeface="Consolas" panose="020B0609020204030204" pitchFamily="49" charset="0"/>
+                <a:cs typeface="Consolas" panose="020B0609020204030204" pitchFamily="49" charset="0"/>
+              </a:rPr>
+              <a:t>IIS</a:t>
+            </a:r>
+            <a:r>
+              <a:rPr lang="en-US" noProof="1" smtClean="0">
+                <a:solidFill>
+                  <a:schemeClr val="accent5">
+                    <a:lumMod val="20000"/>
+                    <a:lumOff val="80000"/>
+                  </a:schemeClr>
+                </a:solidFill>
+                <a:cs typeface="Consolas" panose="020B0609020204030204" pitchFamily="49" charset="0"/>
+              </a:rPr>
+              <a:t> </a:t>
+            </a:r>
+            <a:r>
+              <a:rPr lang="en-US" noProof="1" smtClean="0">
+                <a:solidFill>
+                  <a:schemeClr val="accent5">
+                    <a:lumMod val="20000"/>
+                    <a:lumOff val="80000"/>
+                  </a:schemeClr>
+                </a:solidFill>
+                <a:latin typeface="Consolas" panose="020B0609020204030204" pitchFamily="49" charset="0"/>
+                <a:cs typeface="Consolas" panose="020B0609020204030204" pitchFamily="49" charset="0"/>
+              </a:rPr>
+              <a:t>APPPOOL\DefaultAppPool</a:t>
+            </a:r>
+            <a:r>
+              <a:rPr lang="en-US" dirty="0" smtClean="0"/>
+              <a:t>"</a:t>
+            </a:r>
+          </a:p>
+          <a:p>
+            <a:pPr lvl="1"/>
+            <a:r>
+              <a:rPr lang="en-US" noProof="1" smtClean="0"/>
+              <a:t>It has no access to SQL Server by default</a:t>
+            </a:r>
+          </a:p>
+          <a:p>
+            <a:r>
+              <a:rPr lang="en-US" noProof="1" smtClean="0"/>
+              <a:t>To access SQL Server DB from IIS:</a:t>
+            </a:r>
+          </a:p>
+          <a:p>
+            <a:pPr lvl="1"/>
+            <a:r>
+              <a:rPr lang="en-US" noProof="1" smtClean="0"/>
+              <a:t>Change the connection string in Web.config during the deployment</a:t>
+            </a:r>
+          </a:p>
+          <a:p>
+            <a:pPr lvl="1"/>
+            <a:r>
+              <a:rPr lang="en-US" noProof="1"/>
+              <a:t>Create a user </a:t>
+            </a:r>
+            <a:r>
+              <a:rPr lang="en-US" noProof="1" smtClean="0"/>
+              <a:t>"</a:t>
+            </a:r>
+            <a:r>
+              <a:rPr lang="en-US" noProof="1" smtClean="0">
+                <a:solidFill>
+                  <a:schemeClr val="accent5">
+                    <a:lumMod val="20000"/>
+                    <a:lumOff val="80000"/>
+                  </a:schemeClr>
+                </a:solidFill>
+                <a:latin typeface="Consolas" panose="020B0609020204030204" pitchFamily="49" charset="0"/>
+                <a:cs typeface="Consolas" panose="020B0609020204030204" pitchFamily="49" charset="0"/>
+              </a:rPr>
+              <a:t>IIS</a:t>
+            </a:r>
+            <a:r>
+              <a:rPr lang="en-US" noProof="1" smtClean="0">
+                <a:solidFill>
+                  <a:schemeClr val="accent5">
+                    <a:lumMod val="20000"/>
+                    <a:lumOff val="80000"/>
+                  </a:schemeClr>
+                </a:solidFill>
+                <a:cs typeface="Consolas" panose="020B0609020204030204" pitchFamily="49" charset="0"/>
+              </a:rPr>
+              <a:t> </a:t>
+            </a:r>
+            <a:r>
+              <a:rPr lang="en-US" noProof="1" smtClean="0">
+                <a:solidFill>
+                  <a:schemeClr val="accent5">
+                    <a:lumMod val="20000"/>
+                    <a:lumOff val="80000"/>
+                  </a:schemeClr>
+                </a:solidFill>
+                <a:latin typeface="Consolas" panose="020B0609020204030204" pitchFamily="49" charset="0"/>
+                <a:cs typeface="Consolas" panose="020B0609020204030204" pitchFamily="49" charset="0"/>
+              </a:rPr>
+              <a:t>APPPOOL\DefaultAppPool</a:t>
+            </a:r>
+            <a:r>
+              <a:rPr lang="en-US" noProof="1" smtClean="0"/>
+              <a:t>" for your DB in SQL Server</a:t>
+            </a:r>
+          </a:p>
+          <a:p>
+            <a:pPr lvl="1"/>
+            <a:r>
+              <a:rPr lang="en-US" noProof="1" smtClean="0"/>
+              <a:t>Assign "db_owner" database role</a:t>
+            </a:r>
+            <a:endParaRPr lang="en-US" noProof="1"/>
+          </a:p>
+        </p:txBody>
+      </p:sp>
+      <p:sp>
+        <p:nvSpPr>
+          <p:cNvPr id="4" name="Slide Number Placeholder 3"/>
+          <p:cNvSpPr>
+            <a:spLocks noGrp="1"/>
+          </p:cNvSpPr>
+          <p:nvPr>
+            <p:ph type="sldNum" sz="quarter" idx="10"/>
+          </p:nvPr>
+        </p:nvSpPr>
+        <p:spPr/>
+        <p:txBody>
+          <a:bodyPr/>
+          <a:lstStyle/>
+          <a:p>
+            <a:pPr>
+              <a:defRPr/>
+            </a:pPr>
+            <a:fld id="{58452FF4-89E3-4D1B-9927-2DBDC00E58D7}" type="slidenum">
+              <a:rPr lang="en-US" smtClean="0"/>
+              <a:pPr>
+                <a:defRPr/>
+              </a:pPr>
+              <a:t>17</a:t>
+            </a:fld>
+            <a:endParaRPr lang="en-US" dirty="0"/>
+          </a:p>
+        </p:txBody>
+      </p:sp>
+    </p:spTree>
+    <p:extLst>
+      <p:ext uri="{BB962C8B-B14F-4D97-AF65-F5344CB8AC3E}">
+        <p14:creationId xmlns:p14="http://schemas.microsoft.com/office/powerpoint/2010/main" val="2897922066"/>
       </p:ext>
     </p:extLst>
   </p:cSld>
@@ -9352,7 +9605,7 @@
           <a:p>
             <a:r>
               <a:rPr lang="en-US" dirty="0" smtClean="0"/>
-              <a:t>What Files to Deploy?</a:t>
+              <a:t>Creating IIS user in SQL Server</a:t>
             </a:r>
             <a:endParaRPr lang="en-US" dirty="0"/>
           </a:p>
@@ -9368,30 +9621,18 @@
             <p:ph idx="1"/>
           </p:nvPr>
         </p:nvSpPr>
-        <p:spPr>
-          <a:xfrm>
-            <a:off x="228600" y="990600"/>
-            <a:ext cx="8686800" cy="5715000"/>
-          </a:xfrm>
-        </p:spPr>
+        <p:spPr/>
         <p:txBody>
           <a:bodyPr/>
           <a:lstStyle/>
           <a:p>
             <a:r>
-              <a:rPr lang="en-US" dirty="0"/>
-              <a:t>Files to copy to the IIS application directory</a:t>
-            </a:r>
-            <a:r>
               <a:rPr lang="en-US" dirty="0" smtClean="0"/>
-              <a:t>:</a:t>
-            </a:r>
-          </a:p>
-          <a:p>
-            <a:pPr lvl="1"/>
-            <a:r>
-              <a:rPr lang="en-US" dirty="0" smtClean="0"/>
-              <a:t>Pages &amp; controls: </a:t>
+              <a:t>Creating and configuring the </a:t>
+            </a:r>
+            <a:r>
+              <a:rPr lang="en-US" noProof="1"/>
+              <a:t>"</a:t>
             </a:r>
             <a:r>
               <a:rPr lang="en-US" noProof="1">
@@ -9404,27 +9645,22 @@
                 <a:latin typeface="Consolas" panose="020B0609020204030204" pitchFamily="49" charset="0"/>
                 <a:cs typeface="Consolas" panose="020B0609020204030204" pitchFamily="49" charset="0"/>
               </a:rPr>
-              <a:t>*.</a:t>
-            </a:r>
-            <a:r>
-              <a:rPr lang="en-US" noProof="1" smtClean="0">
+              <a:t>IIS</a:t>
+            </a:r>
+            <a:r>
+              <a:rPr lang="en-US" noProof="1">
                 <a:solidFill>
                   <a:schemeClr val="accent5">
                     <a:lumMod val="20000"/>
                     <a:lumOff val="80000"/>
                   </a:schemeClr>
                 </a:solidFill>
-                <a:latin typeface="Consolas" panose="020B0609020204030204" pitchFamily="49" charset="0"/>
                 <a:cs typeface="Consolas" panose="020B0609020204030204" pitchFamily="49" charset="0"/>
               </a:rPr>
-              <a:t>aspx</a:t>
-            </a:r>
-            <a:r>
-              <a:rPr lang="en-US" dirty="0" smtClean="0"/>
-              <a:t>, </a:t>
-            </a:r>
-            <a:r>
-              <a:rPr lang="en-US" noProof="1" smtClean="0">
+              <a:t> </a:t>
+            </a:r>
+            <a:r>
+              <a:rPr lang="en-US" noProof="1">
                 <a:solidFill>
                   <a:schemeClr val="accent5">
                     <a:lumMod val="20000"/>
@@ -9434,284 +9670,11 @@
                 <a:latin typeface="Consolas" panose="020B0609020204030204" pitchFamily="49" charset="0"/>
                 <a:cs typeface="Consolas" panose="020B0609020204030204" pitchFamily="49" charset="0"/>
               </a:rPr>
-              <a:t>*.Master</a:t>
-            </a:r>
-            <a:r>
-              <a:rPr lang="en-US" dirty="0" smtClean="0"/>
-              <a:t>, </a:t>
-            </a:r>
-            <a:r>
-              <a:rPr lang="en-US" noProof="1" smtClean="0">
-                <a:solidFill>
-                  <a:schemeClr val="accent5">
-                    <a:lumMod val="20000"/>
-                    <a:lumOff val="80000"/>
-                  </a:schemeClr>
-                </a:solidFill>
-                <a:latin typeface="Consolas" panose="020B0609020204030204" pitchFamily="49" charset="0"/>
-                <a:cs typeface="Consolas" panose="020B0609020204030204" pitchFamily="49" charset="0"/>
-              </a:rPr>
-              <a:t>*.ascx</a:t>
-            </a:r>
-          </a:p>
-          <a:p>
-            <a:pPr lvl="1"/>
-            <a:r>
-              <a:rPr lang="en-US" dirty="0" smtClean="0"/>
-              <a:t>Resources: </a:t>
-            </a:r>
-            <a:r>
-              <a:rPr lang="en-US" noProof="1" smtClean="0">
-                <a:solidFill>
-                  <a:schemeClr val="accent5">
-                    <a:lumMod val="20000"/>
-                    <a:lumOff val="80000"/>
-                  </a:schemeClr>
-                </a:solidFill>
-                <a:latin typeface="Consolas" panose="020B0609020204030204" pitchFamily="49" charset="0"/>
-                <a:cs typeface="Consolas" panose="020B0609020204030204" pitchFamily="49" charset="0"/>
-              </a:rPr>
-              <a:t>*.jpg</a:t>
-            </a:r>
-            <a:r>
-              <a:rPr lang="en-US" dirty="0" smtClean="0"/>
-              <a:t>, </a:t>
-            </a:r>
-            <a:r>
-              <a:rPr lang="en-US" noProof="1" smtClean="0">
-                <a:solidFill>
-                  <a:schemeClr val="accent5">
-                    <a:lumMod val="20000"/>
-                    <a:lumOff val="80000"/>
-                  </a:schemeClr>
-                </a:solidFill>
-                <a:latin typeface="Consolas" panose="020B0609020204030204" pitchFamily="49" charset="0"/>
-                <a:cs typeface="Consolas" panose="020B0609020204030204" pitchFamily="49" charset="0"/>
-              </a:rPr>
-              <a:t>*.png</a:t>
-            </a:r>
-            <a:r>
-              <a:rPr lang="en-US" dirty="0" smtClean="0"/>
-              <a:t>,</a:t>
-            </a:r>
-            <a:r>
-              <a:rPr lang="en-US" dirty="0"/>
-              <a:t> </a:t>
-            </a:r>
-            <a:r>
-              <a:rPr lang="en-US" noProof="1" smtClean="0">
-                <a:solidFill>
-                  <a:schemeClr val="accent5">
-                    <a:lumMod val="20000"/>
-                    <a:lumOff val="80000"/>
-                  </a:schemeClr>
-                </a:solidFill>
-                <a:latin typeface="Consolas" panose="020B0609020204030204" pitchFamily="49" charset="0"/>
-                <a:cs typeface="Consolas" panose="020B0609020204030204" pitchFamily="49" charset="0"/>
-              </a:rPr>
-              <a:t>*.gif</a:t>
-            </a:r>
-            <a:r>
-              <a:rPr lang="en-US" dirty="0"/>
-              <a:t> , </a:t>
-            </a:r>
-            <a:r>
-              <a:rPr lang="en-US" noProof="1" smtClean="0">
-                <a:solidFill>
-                  <a:schemeClr val="accent5">
-                    <a:lumMod val="20000"/>
-                    <a:lumOff val="80000"/>
-                  </a:schemeClr>
-                </a:solidFill>
-                <a:latin typeface="Consolas" panose="020B0609020204030204" pitchFamily="49" charset="0"/>
-                <a:cs typeface="Consolas" panose="020B0609020204030204" pitchFamily="49" charset="0"/>
-              </a:rPr>
-              <a:t>*.css</a:t>
-            </a:r>
-            <a:r>
-              <a:rPr lang="en-US" dirty="0" smtClean="0"/>
-              <a:t>, </a:t>
-            </a:r>
-            <a:r>
-              <a:rPr lang="en-US" noProof="1">
-                <a:solidFill>
-                  <a:schemeClr val="accent5">
-                    <a:lumMod val="20000"/>
-                    <a:lumOff val="80000"/>
-                  </a:schemeClr>
-                </a:solidFill>
-                <a:latin typeface="Consolas" panose="020B0609020204030204" pitchFamily="49" charset="0"/>
-                <a:cs typeface="Consolas" panose="020B0609020204030204" pitchFamily="49" charset="0"/>
-              </a:rPr>
-              <a:t>*.js</a:t>
-            </a:r>
-            <a:endParaRPr lang="en-US" dirty="0" smtClean="0"/>
-          </a:p>
-          <a:p>
-            <a:pPr lvl="1"/>
-            <a:r>
-              <a:rPr lang="en-US" dirty="0" smtClean="0"/>
-              <a:t>Compiled C# files: </a:t>
-            </a:r>
-            <a:r>
-              <a:rPr lang="en-US" noProof="1" smtClean="0">
-                <a:solidFill>
-                  <a:schemeClr val="accent5">
-                    <a:lumMod val="20000"/>
-                    <a:lumOff val="80000"/>
-                  </a:schemeClr>
-                </a:solidFill>
-                <a:latin typeface="Consolas" panose="020B0609020204030204" pitchFamily="49" charset="0"/>
-                <a:cs typeface="Consolas" panose="020B0609020204030204" pitchFamily="49" charset="0"/>
-              </a:rPr>
-              <a:t>bin\*.dll</a:t>
-            </a:r>
-          </a:p>
-          <a:p>
-            <a:pPr lvl="1"/>
-            <a:r>
-              <a:rPr lang="en-US" dirty="0" smtClean="0"/>
-              <a:t>Config </a:t>
-            </a:r>
-            <a:r>
-              <a:rPr lang="en-US" dirty="0"/>
-              <a:t>files: </a:t>
-            </a:r>
-            <a:r>
-              <a:rPr lang="en-US" noProof="1">
-                <a:solidFill>
-                  <a:schemeClr val="accent5">
-                    <a:lumMod val="20000"/>
-                    <a:lumOff val="80000"/>
-                  </a:schemeClr>
-                </a:solidFill>
-                <a:latin typeface="Consolas" panose="020B0609020204030204" pitchFamily="49" charset="0"/>
-                <a:cs typeface="Consolas" panose="020B0609020204030204" pitchFamily="49" charset="0"/>
-              </a:rPr>
-              <a:t>Web.config</a:t>
-            </a:r>
-            <a:r>
-              <a:rPr lang="en-US" dirty="0"/>
-              <a:t>, </a:t>
-            </a:r>
-            <a:r>
-              <a:rPr lang="en-US" noProof="1">
-                <a:solidFill>
-                  <a:schemeClr val="accent5">
-                    <a:lumMod val="20000"/>
-                    <a:lumOff val="80000"/>
-                  </a:schemeClr>
-                </a:solidFill>
-                <a:latin typeface="Consolas" panose="020B0609020204030204" pitchFamily="49" charset="0"/>
-                <a:cs typeface="Consolas" panose="020B0609020204030204" pitchFamily="49" charset="0"/>
-              </a:rPr>
-              <a:t>Global.asax</a:t>
-            </a:r>
-          </a:p>
-          <a:p>
-            <a:pPr>
-              <a:spcBef>
-                <a:spcPts val="1200"/>
-              </a:spcBef>
-            </a:pPr>
-            <a:r>
-              <a:rPr lang="en-US" dirty="0" smtClean="0"/>
-              <a:t>Don't deploy these files:</a:t>
-            </a:r>
-          </a:p>
-          <a:p>
-            <a:pPr lvl="1"/>
-            <a:r>
-              <a:rPr lang="en-US" dirty="0" smtClean="0"/>
-              <a:t>Source code: </a:t>
-            </a:r>
-            <a:r>
-              <a:rPr lang="en-US" noProof="1" smtClean="0">
-                <a:solidFill>
-                  <a:schemeClr val="accent5">
-                    <a:lumMod val="20000"/>
-                    <a:lumOff val="80000"/>
-                  </a:schemeClr>
-                </a:solidFill>
-                <a:latin typeface="Consolas" panose="020B0609020204030204" pitchFamily="49" charset="0"/>
-                <a:cs typeface="Consolas" panose="020B0609020204030204" pitchFamily="49" charset="0"/>
-              </a:rPr>
-              <a:t>*.cs</a:t>
-            </a:r>
-            <a:r>
-              <a:rPr lang="en-US" dirty="0" smtClean="0"/>
-              <a:t>, </a:t>
-            </a:r>
-            <a:r>
-              <a:rPr lang="en-US" noProof="1" smtClean="0">
-                <a:solidFill>
-                  <a:schemeClr val="accent5">
-                    <a:lumMod val="20000"/>
-                    <a:lumOff val="80000"/>
-                  </a:schemeClr>
-                </a:solidFill>
-                <a:latin typeface="Consolas" panose="020B0609020204030204" pitchFamily="49" charset="0"/>
-                <a:cs typeface="Consolas" panose="020B0609020204030204" pitchFamily="49" charset="0"/>
-              </a:rPr>
-              <a:t>*.csproj</a:t>
-            </a:r>
-            <a:r>
-              <a:rPr lang="en-US" dirty="0" smtClean="0"/>
-              <a:t>, </a:t>
-            </a:r>
-            <a:r>
-              <a:rPr lang="en-US" noProof="1" smtClean="0">
-                <a:solidFill>
-                  <a:schemeClr val="accent5">
-                    <a:lumMod val="20000"/>
-                    <a:lumOff val="80000"/>
-                  </a:schemeClr>
-                </a:solidFill>
-                <a:latin typeface="Consolas" panose="020B0609020204030204" pitchFamily="49" charset="0"/>
-                <a:cs typeface="Consolas" panose="020B0609020204030204" pitchFamily="49" charset="0"/>
-              </a:rPr>
-              <a:t>*.sln</a:t>
-            </a:r>
-          </a:p>
-          <a:p>
-            <a:pPr lvl="1"/>
-            <a:r>
-              <a:rPr lang="en-US" dirty="0" smtClean="0"/>
-              <a:t>Databases: </a:t>
-            </a:r>
-            <a:r>
-              <a:rPr lang="en-US" noProof="1" smtClean="0">
-                <a:solidFill>
-                  <a:schemeClr val="accent5">
-                    <a:lumMod val="20000"/>
-                    <a:lumOff val="80000"/>
-                  </a:schemeClr>
-                </a:solidFill>
-                <a:latin typeface="Consolas" panose="020B0609020204030204" pitchFamily="49" charset="0"/>
-                <a:cs typeface="Consolas" panose="020B0609020204030204" pitchFamily="49" charset="0"/>
-              </a:rPr>
-              <a:t>*.mdf</a:t>
-            </a:r>
-            <a:r>
-              <a:rPr lang="en-US" dirty="0" smtClean="0"/>
-              <a:t> / </a:t>
-            </a:r>
-            <a:r>
-              <a:rPr lang="en-US" noProof="1" smtClean="0">
-                <a:solidFill>
-                  <a:schemeClr val="accent5">
-                    <a:lumMod val="20000"/>
-                    <a:lumOff val="80000"/>
-                  </a:schemeClr>
-                </a:solidFill>
-                <a:latin typeface="Consolas" panose="020B0609020204030204" pitchFamily="49" charset="0"/>
-                <a:cs typeface="Consolas" panose="020B0609020204030204" pitchFamily="49" charset="0"/>
-              </a:rPr>
-              <a:t>*.ldf</a:t>
-            </a:r>
-            <a:r>
-              <a:rPr lang="en-US" dirty="0" smtClean="0"/>
-              <a:t> (deploy separately)</a:t>
+              <a:t>APPPOOL\DefaultAppPool</a:t>
+            </a:r>
+            <a:r>
+              <a:rPr lang="en-US" noProof="1" smtClean="0"/>
+              <a:t>" in SQL Server</a:t>
             </a:r>
             <a:endParaRPr lang="en-US" dirty="0"/>
           </a:p>
@@ -9746,10 +9709,134 @@
           </a:p>
         </p:txBody>
       </p:sp>
+      <p:pic>
+        <p:nvPicPr>
+          <p:cNvPr id="5" name="Picture 4"/>
+          <p:cNvPicPr>
+            <a:picLocks noChangeAspect="1"/>
+          </p:cNvPicPr>
+          <p:nvPr/>
+        </p:nvPicPr>
+        <p:blipFill>
+          <a:blip r:embed="rId2"/>
+          <a:stretch>
+            <a:fillRect/>
+          </a:stretch>
+        </p:blipFill>
+        <p:spPr>
+          <a:xfrm>
+            <a:off x="3235171" y="2209800"/>
+            <a:ext cx="4710898" cy="4229100"/>
+          </a:xfrm>
+          <a:prstGeom prst="rect">
+            <a:avLst/>
+          </a:prstGeom>
+        </p:spPr>
+      </p:pic>
+      <p:pic>
+        <p:nvPicPr>
+          <p:cNvPr id="6" name="Picture 5"/>
+          <p:cNvPicPr>
+            <a:picLocks noChangeAspect="1"/>
+          </p:cNvPicPr>
+          <p:nvPr/>
+        </p:nvPicPr>
+        <p:blipFill>
+          <a:blip r:embed="rId3"/>
+          <a:stretch>
+            <a:fillRect/>
+          </a:stretch>
+        </p:blipFill>
+        <p:spPr>
+          <a:xfrm>
+            <a:off x="609600" y="2895601"/>
+            <a:ext cx="2278364" cy="2943224"/>
+          </a:xfrm>
+          <a:prstGeom prst="rect">
+            <a:avLst/>
+          </a:prstGeom>
+        </p:spPr>
+      </p:pic>
+      <p:pic>
+        <p:nvPicPr>
+          <p:cNvPr id="7" name="Picture 6"/>
+          <p:cNvPicPr>
+            <a:picLocks noChangeAspect="1"/>
+          </p:cNvPicPr>
+          <p:nvPr/>
+        </p:nvPicPr>
+        <p:blipFill rotWithShape="1">
+          <a:blip r:embed="rId4" cstate="screen">
+            <a:extLst>
+              <a:ext uri="{28A0092B-C50C-407E-A947-70E740481C1C}">
+                <a14:useLocalDpi xmlns:a14="http://schemas.microsoft.com/office/drawing/2010/main"/>
+              </a:ext>
+            </a:extLst>
+          </a:blip>
+          <a:srcRect/>
+          <a:stretch/>
+        </p:blipFill>
+        <p:spPr>
+          <a:xfrm>
+            <a:off x="5497178" y="4038600"/>
+            <a:ext cx="2884822" cy="1972405"/>
+          </a:xfrm>
+          <a:prstGeom prst="rect">
+            <a:avLst/>
+          </a:prstGeom>
+          <a:effectLst>
+            <a:outerShdw blurRad="63500" sx="102000" sy="102000" algn="ctr" rotWithShape="0">
+              <a:prstClr val="black">
+                <a:alpha val="40000"/>
+              </a:prstClr>
+            </a:outerShdw>
+          </a:effectLst>
+        </p:spPr>
+      </p:pic>
+      <p:cxnSp>
+        <p:nvCxnSpPr>
+          <p:cNvPr id="8" name="Straight Arrow Connector 7"/>
+          <p:cNvCxnSpPr/>
+          <p:nvPr/>
+        </p:nvCxnSpPr>
+        <p:spPr>
+          <a:xfrm>
+            <a:off x="2860565" y="4366998"/>
+            <a:ext cx="374606" cy="215"/>
+          </a:xfrm>
+          <a:prstGeom prst="straightConnector1">
+            <a:avLst/>
+          </a:prstGeom>
+          <a:ln w="31750">
+            <a:solidFill>
+              <a:schemeClr val="accent5">
+                <a:lumMod val="20000"/>
+                <a:lumOff val="80000"/>
+              </a:schemeClr>
+            </a:solidFill>
+            <a:headEnd type="none"/>
+            <a:tailEnd type="arrow"/>
+          </a:ln>
+        </p:spPr>
+        <p:style>
+          <a:lnRef idx="2">
+            <a:schemeClr val="accent5"/>
+          </a:lnRef>
+          <a:fillRef idx="0">
+            <a:schemeClr val="accent5"/>
+          </a:fillRef>
+          <a:effectRef idx="1">
+            <a:schemeClr val="accent5"/>
+          </a:effectRef>
+          <a:fontRef idx="minor">
+            <a:schemeClr val="tx1"/>
+          </a:fontRef>
+        </p:style>
+      </p:cxnSp>
     </p:spTree>
     <p:extLst>
       <p:ext uri="{BB962C8B-B14F-4D97-AF65-F5344CB8AC3E}">
-        <p14:creationId xmlns:p14="http://schemas.microsoft.com/office/powerpoint/2010/main" val="983068792"/>
+        <p14:creationId xmlns:p14="http://schemas.microsoft.com/office/powerpoint/2010/main" val="1759498413"/>
       </p:ext>
     </p:extLst>
   </p:cSld>
@@ -9785,18 +9872,18 @@
       </p:grpSpPr>
       <p:sp>
         <p:nvSpPr>
-          <p:cNvPr id="2" name="Title 1"/>
+          <p:cNvPr id="5" name="Title 4"/>
           <p:cNvSpPr>
             <a:spLocks noGrp="1"/>
           </p:cNvSpPr>
           <p:nvPr>
-            <p:ph type="title"/>
+            <p:ph type="ctrTitle"/>
           </p:nvPr>
         </p:nvSpPr>
         <p:spPr>
           <a:xfrm>
-            <a:off x="1828800" y="228600"/>
-            <a:ext cx="7086600" cy="838200"/>
+            <a:off x="609600" y="4688417"/>
+            <a:ext cx="7924800" cy="685800"/>
           </a:xfrm>
         </p:spPr>
         <p:txBody>
@@ -9805,15 +9892,7 @@
           <a:p>
             <a:r>
               <a:rPr lang="en-US" dirty="0" smtClean="0"/>
-              <a:t>Configuring Database Permissions</a:t>
-            </a:r>
-            <a:r>
-              <a:rPr lang="bg-BG" dirty="0" smtClean="0"/>
-              <a:t> </a:t>
-            </a:r>
-            <a:r>
-              <a:rPr lang="en-US" dirty="0" smtClean="0"/>
-              <a:t>for SQL Server</a:t>
+              <a:t>Web Publishing from VS</a:t>
             </a:r>
             <a:endParaRPr lang="en-US" dirty="0"/>
           </a:p>
@@ -9821,18 +9900,18 @@
       </p:sp>
       <p:sp>
         <p:nvSpPr>
-          <p:cNvPr id="3" name="Content Placeholder 2"/>
+          <p:cNvPr id="6" name="Subtitle 5"/>
           <p:cNvSpPr>
             <a:spLocks noGrp="1"/>
           </p:cNvSpPr>
           <p:nvPr>
-            <p:ph idx="1"/>
+            <p:ph type="subTitle" idx="1"/>
           </p:nvPr>
         </p:nvSpPr>
         <p:spPr>
           <a:xfrm>
-            <a:off x="228600" y="1371600"/>
-            <a:ext cx="8686800" cy="5334000"/>
+            <a:off x="609600" y="5450680"/>
+            <a:ext cx="7924800" cy="569120"/>
           </a:xfrm>
         </p:spPr>
         <p:txBody>
@@ -9841,175 +9920,208 @@
           <a:p>
             <a:r>
               <a:rPr lang="en-US" dirty="0" smtClean="0"/>
-              <a:t>Typically in </a:t>
-            </a:r>
-            <a:r>
-              <a:rPr lang="en-US" dirty="0"/>
-              <a:t>IIS your application runs under the </a:t>
-            </a:r>
-            <a:r>
-              <a:rPr lang="en-US" dirty="0" smtClean="0"/>
-              <a:t>user "</a:t>
-            </a:r>
-            <a:r>
-              <a:rPr lang="en-US" noProof="1" smtClean="0">
-                <a:solidFill>
-                  <a:schemeClr val="accent5">
-                    <a:lumMod val="20000"/>
-                    <a:lumOff val="80000"/>
-                  </a:schemeClr>
-                </a:solidFill>
-                <a:latin typeface="Consolas" panose="020B0609020204030204" pitchFamily="49" charset="0"/>
-                <a:cs typeface="Consolas" panose="020B0609020204030204" pitchFamily="49" charset="0"/>
-              </a:rPr>
-              <a:t>IIS</a:t>
-            </a:r>
-            <a:r>
-              <a:rPr lang="en-US" noProof="1" smtClean="0">
-                <a:solidFill>
-                  <a:schemeClr val="accent5">
-                    <a:lumMod val="20000"/>
-                    <a:lumOff val="80000"/>
-                  </a:schemeClr>
-                </a:solidFill>
-                <a:cs typeface="Consolas" panose="020B0609020204030204" pitchFamily="49" charset="0"/>
-              </a:rPr>
-              <a:t> </a:t>
-            </a:r>
-            <a:r>
-              <a:rPr lang="en-US" noProof="1" smtClean="0">
-                <a:solidFill>
-                  <a:schemeClr val="accent5">
-                    <a:lumMod val="20000"/>
-                    <a:lumOff val="80000"/>
-                  </a:schemeClr>
-                </a:solidFill>
-                <a:latin typeface="Consolas" panose="020B0609020204030204" pitchFamily="49" charset="0"/>
-                <a:cs typeface="Consolas" panose="020B0609020204030204" pitchFamily="49" charset="0"/>
-              </a:rPr>
-              <a:t>APPPOOL\DefaultAppPool</a:t>
-            </a:r>
-            <a:r>
-              <a:rPr lang="en-US" dirty="0" smtClean="0"/>
-              <a:t>"</a:t>
-            </a:r>
-          </a:p>
-          <a:p>
-            <a:pPr lvl="1"/>
-            <a:r>
-              <a:rPr lang="en-US" noProof="1" smtClean="0"/>
-              <a:t>It has no access to SQL Server by default</a:t>
-            </a:r>
-          </a:p>
-          <a:p>
-            <a:r>
-              <a:rPr lang="en-US" noProof="1" smtClean="0"/>
-              <a:t>To access SQL Server DB from IIS:</a:t>
-            </a:r>
-          </a:p>
-          <a:p>
-            <a:pPr lvl="1"/>
-            <a:r>
-              <a:rPr lang="en-US" noProof="1" smtClean="0"/>
-              <a:t>Change the connection string in Web.config during the deployment</a:t>
-            </a:r>
-          </a:p>
-          <a:p>
-            <a:pPr lvl="1"/>
-            <a:r>
-              <a:rPr lang="en-US" noProof="1"/>
-              <a:t>Create a user </a:t>
-            </a:r>
-            <a:r>
-              <a:rPr lang="en-US" noProof="1" smtClean="0"/>
-              <a:t>"</a:t>
-            </a:r>
-            <a:r>
-              <a:rPr lang="en-US" noProof="1" smtClean="0">
-                <a:solidFill>
-                  <a:schemeClr val="accent5">
-                    <a:lumMod val="20000"/>
-                    <a:lumOff val="80000"/>
-                  </a:schemeClr>
-                </a:solidFill>
-                <a:latin typeface="Consolas" panose="020B0609020204030204" pitchFamily="49" charset="0"/>
-                <a:cs typeface="Consolas" panose="020B0609020204030204" pitchFamily="49" charset="0"/>
-              </a:rPr>
-              <a:t>IIS</a:t>
-            </a:r>
-            <a:r>
-              <a:rPr lang="en-US" noProof="1" smtClean="0">
-                <a:solidFill>
-                  <a:schemeClr val="accent5">
-                    <a:lumMod val="20000"/>
-                    <a:lumOff val="80000"/>
-                  </a:schemeClr>
-                </a:solidFill>
-                <a:cs typeface="Consolas" panose="020B0609020204030204" pitchFamily="49" charset="0"/>
-              </a:rPr>
-              <a:t> </a:t>
-            </a:r>
-            <a:r>
-              <a:rPr lang="en-US" noProof="1" smtClean="0">
-                <a:solidFill>
-                  <a:schemeClr val="accent5">
-                    <a:lumMod val="20000"/>
-                    <a:lumOff val="80000"/>
-                  </a:schemeClr>
-                </a:solidFill>
-                <a:latin typeface="Consolas" panose="020B0609020204030204" pitchFamily="49" charset="0"/>
-                <a:cs typeface="Consolas" panose="020B0609020204030204" pitchFamily="49" charset="0"/>
-              </a:rPr>
-              <a:t>APPPOOL\DefaultAppPool</a:t>
-            </a:r>
-            <a:r>
-              <a:rPr lang="en-US" noProof="1" smtClean="0"/>
-              <a:t>" for your DB in SQL Server</a:t>
-            </a:r>
-          </a:p>
-          <a:p>
-            <a:pPr lvl="1"/>
-            <a:r>
-              <a:rPr lang="en-US" noProof="1" smtClean="0"/>
-              <a:t>Assign "db_owner" database role</a:t>
-            </a:r>
-            <a:endParaRPr lang="en-US" noProof="1"/>
+              <a:t>Publish Web App from VS to IIS</a:t>
+            </a:r>
+            <a:endParaRPr lang="en-US" dirty="0"/>
           </a:p>
         </p:txBody>
       </p:sp>
-      <p:sp>
-        <p:nvSpPr>
-          <p:cNvPr id="4" name="Slide Number Placeholder 3"/>
-          <p:cNvSpPr>
-            <a:spLocks noGrp="1"/>
-          </p:cNvSpPr>
-          <p:nvPr>
-            <p:ph type="sldNum" sz="quarter" idx="10"/>
-          </p:nvPr>
-        </p:nvSpPr>
-        <p:spPr/>
-        <p:txBody>
-          <a:bodyPr/>
-          <a:lstStyle/>
-          <a:p>
-            <a:pPr>
-              <a:defRPr/>
-            </a:pPr>
-            <a:fld id="{58452FF4-89E3-4D1B-9927-2DBDC00E58D7}" type="slidenum">
-              <a:rPr lang="en-US" smtClean="0"/>
-              <a:pPr>
-                <a:defRPr/>
-              </a:pPr>
-              <a:t>19</a:t>
-            </a:fld>
-            <a:endParaRPr lang="en-US" dirty="0"/>
-          </a:p>
-        </p:txBody>
-      </p:sp>
+      <p:pic>
+        <p:nvPicPr>
+          <p:cNvPr id="7" name="Picture 6"/>
+          <p:cNvPicPr>
+            <a:picLocks noChangeAspect="1"/>
+          </p:cNvPicPr>
+          <p:nvPr/>
+        </p:nvPicPr>
+        <p:blipFill>
+          <a:blip r:embed="rId2" cstate="screen">
+            <a:extLst>
+              <a:ext uri="{28A0092B-C50C-407E-A947-70E740481C1C}">
+                <a14:useLocalDpi xmlns:a14="http://schemas.microsoft.com/office/drawing/2010/main"/>
+              </a:ext>
+            </a:extLst>
+          </a:blip>
+          <a:stretch>
+            <a:fillRect/>
+          </a:stretch>
+        </p:blipFill>
+        <p:spPr>
+          <a:xfrm>
+            <a:off x="2450432" y="1524000"/>
+            <a:ext cx="3352800" cy="2631016"/>
+          </a:xfrm>
+          <a:prstGeom prst="rect">
+            <a:avLst/>
+          </a:prstGeom>
+        </p:spPr>
+      </p:pic>
+      <p:cxnSp>
+        <p:nvCxnSpPr>
+          <p:cNvPr id="13" name="Straight Arrow Connector 12"/>
+          <p:cNvCxnSpPr/>
+          <p:nvPr/>
+        </p:nvCxnSpPr>
+        <p:spPr>
+          <a:xfrm>
+            <a:off x="2039730" y="2827261"/>
+            <a:ext cx="374606" cy="215"/>
+          </a:xfrm>
+          <a:prstGeom prst="straightConnector1">
+            <a:avLst/>
+          </a:prstGeom>
+          <a:ln w="31750">
+            <a:solidFill>
+              <a:schemeClr val="accent5">
+                <a:lumMod val="20000"/>
+                <a:lumOff val="80000"/>
+              </a:schemeClr>
+            </a:solidFill>
+            <a:headEnd type="none"/>
+            <a:tailEnd type="arrow"/>
+          </a:ln>
+        </p:spPr>
+        <p:style>
+          <a:lnRef idx="2">
+            <a:schemeClr val="accent5"/>
+          </a:lnRef>
+          <a:fillRef idx="0">
+            <a:schemeClr val="accent5"/>
+          </a:fillRef>
+          <a:effectRef idx="1">
+            <a:schemeClr val="accent5"/>
+          </a:effectRef>
+          <a:fontRef idx="minor">
+            <a:schemeClr val="tx1"/>
+          </a:fontRef>
+        </p:style>
+      </p:cxnSp>
+      <p:cxnSp>
+        <p:nvCxnSpPr>
+          <p:cNvPr id="15" name="Straight Arrow Connector 14"/>
+          <p:cNvCxnSpPr/>
+          <p:nvPr/>
+        </p:nvCxnSpPr>
+        <p:spPr>
+          <a:xfrm>
+            <a:off x="5827296" y="2827261"/>
+            <a:ext cx="374606" cy="215"/>
+          </a:xfrm>
+          <a:prstGeom prst="straightConnector1">
+            <a:avLst/>
+          </a:prstGeom>
+          <a:ln w="31750">
+            <a:solidFill>
+              <a:schemeClr val="accent5">
+                <a:lumMod val="20000"/>
+                <a:lumOff val="80000"/>
+              </a:schemeClr>
+            </a:solidFill>
+            <a:headEnd type="none"/>
+            <a:tailEnd type="arrow"/>
+          </a:ln>
+        </p:spPr>
+        <p:style>
+          <a:lnRef idx="2">
+            <a:schemeClr val="accent5"/>
+          </a:lnRef>
+          <a:fillRef idx="0">
+            <a:schemeClr val="accent5"/>
+          </a:fillRef>
+          <a:effectRef idx="1">
+            <a:schemeClr val="accent5"/>
+          </a:effectRef>
+          <a:fontRef idx="minor">
+            <a:schemeClr val="tx1"/>
+          </a:fontRef>
+        </p:style>
+      </p:cxnSp>
+      <p:pic>
+        <p:nvPicPr>
+          <p:cNvPr id="11" name="Picture 2" descr="https://static.devexpress.com/Newsletter/2015-07-Visual-Studio/visual-studio-2015-logo-hr2.png"/>
+          <p:cNvPicPr>
+            <a:picLocks noChangeAspect="1" noChangeArrowheads="1"/>
+          </p:cNvPicPr>
+          <p:nvPr/>
+        </p:nvPicPr>
+        <p:blipFill>
+          <a:blip r:embed="rId3" cstate="print">
+            <a:extLst>
+              <a:ext uri="{28A0092B-C50C-407E-A947-70E740481C1C}">
+                <a14:useLocalDpi xmlns:a14="http://schemas.microsoft.com/office/drawing/2010/main" val="0"/>
+              </a:ext>
+            </a:extLst>
+          </a:blip>
+          <a:srcRect/>
+          <a:stretch>
+            <a:fillRect/>
+          </a:stretch>
+        </p:blipFill>
+        <p:spPr bwMode="auto">
+          <a:xfrm>
+            <a:off x="305160" y="2470905"/>
+            <a:ext cx="1710506" cy="712711"/>
+          </a:xfrm>
+          <a:prstGeom prst="rect">
+            <a:avLst/>
+          </a:prstGeom>
+          <a:noFill/>
+          <a:extLst>
+            <a:ext uri="{909E8E84-426E-40DD-AFC4-6F175D3DCCD1}">
+              <a14:hiddenFill xmlns:a14="http://schemas.microsoft.com/office/drawing/2010/main">
+                <a:solidFill>
+                  <a:srgbClr val="FFFFFF"/>
+                </a:solidFill>
+              </a14:hiddenFill>
+            </a:ext>
+          </a:extLst>
+        </p:spPr>
+      </p:pic>
+      <p:pic>
+        <p:nvPicPr>
+          <p:cNvPr id="14" name="Picture 2" descr="http://asphostportal.com/img/icon-iis.png"/>
+          <p:cNvPicPr>
+            <a:picLocks noChangeAspect="1" noChangeArrowheads="1"/>
+          </p:cNvPicPr>
+          <p:nvPr/>
+        </p:nvPicPr>
+        <p:blipFill>
+          <a:blip r:embed="rId4" cstate="print">
+            <a:extLst>
+              <a:ext uri="{28A0092B-C50C-407E-A947-70E740481C1C}">
+                <a14:useLocalDpi xmlns:a14="http://schemas.microsoft.com/office/drawing/2010/main" val="0"/>
+              </a:ext>
+            </a:extLst>
+          </a:blip>
+          <a:srcRect/>
+          <a:stretch>
+            <a:fillRect/>
+          </a:stretch>
+        </p:blipFill>
+        <p:spPr bwMode="auto">
+          <a:xfrm>
+            <a:off x="6241451" y="2155354"/>
+            <a:ext cx="2513217" cy="1368307"/>
+          </a:xfrm>
+          <a:prstGeom prst="rect">
+            <a:avLst/>
+          </a:prstGeom>
+          <a:noFill/>
+          <a:extLst>
+            <a:ext uri="{909E8E84-426E-40DD-AFC4-6F175D3DCCD1}">
+              <a14:hiddenFill xmlns:a14="http://schemas.microsoft.com/office/drawing/2010/main">
+                <a:solidFill>
+                  <a:srgbClr val="FFFFFF"/>
+                </a:solidFill>
+              </a14:hiddenFill>
+            </a:ext>
+          </a:extLst>
+        </p:spPr>
+      </p:pic>
     </p:spTree>
     <p:extLst>
       <p:ext uri="{BB962C8B-B14F-4D97-AF65-F5344CB8AC3E}">
-        <p14:creationId xmlns:p14="http://schemas.microsoft.com/office/powerpoint/2010/main" val="2897922066"/>
+        <p14:creationId xmlns:p14="http://schemas.microsoft.com/office/powerpoint/2010/main" val="514934596"/>
       </p:ext>
     </p:extLst>
   </p:cSld>
@@ -10096,7 +10208,7 @@
             </a:pPr>
             <a:r>
               <a:rPr lang="en-US" sz="3000" dirty="0" smtClean="0"/>
-              <a:t>IIS Intro &amp; History</a:t>
+              <a:t>What is IIS?</a:t>
             </a:r>
           </a:p>
           <a:p>
@@ -10215,14 +10327,14 @@
       </p:sp>
       <p:pic>
         <p:nvPicPr>
-          <p:cNvPr id="2050" name="Picture 2" descr="http://www.arvixe.com/images/landing_pages/iis85_hosting.png"/>
+          <p:cNvPr id="6" name="Picture 2" descr="http://asphostportal.com/img/icon-iis.png"/>
           <p:cNvPicPr>
             <a:picLocks noChangeAspect="1" noChangeArrowheads="1"/>
           </p:cNvPicPr>
           <p:nvPr/>
         </p:nvPicPr>
         <p:blipFill>
-          <a:blip r:embed="rId3">
+          <a:blip r:embed="rId3" cstate="print">
             <a:extLst>
               <a:ext uri="{28A0092B-C50C-407E-A947-70E740481C1C}">
                 <a14:useLocalDpi xmlns:a14="http://schemas.microsoft.com/office/drawing/2010/main" val="0"/>
@@ -10236,8 +10348,8 @@
         </p:blipFill>
         <p:spPr bwMode="auto">
           <a:xfrm>
-            <a:off x="6172200" y="838200"/>
-            <a:ext cx="2133600" cy="2133600"/>
+            <a:off x="5867400" y="1066800"/>
+            <a:ext cx="2843650" cy="1548210"/>
           </a:xfrm>
           <a:prstGeom prst="rect">
             <a:avLst/>
@@ -10308,8 +10420,12 @@
           <a:lstStyle/>
           <a:p>
             <a:r>
+              <a:rPr lang="en-US" smtClean="0"/>
+              <a:t>Web Publishing </a:t>
+            </a:r>
+            <a:r>
               <a:rPr lang="en-US" dirty="0" smtClean="0"/>
-              <a:t>Creating IIS user in SQL Server</a:t>
+              <a:t>in VS</a:t>
             </a:r>
             <a:endParaRPr lang="en-US" dirty="0"/>
           </a:p>
@@ -10332,53 +10448,14 @@
           <a:p>
             <a:r>
               <a:rPr lang="en-US" dirty="0" smtClean="0"/>
-              <a:t>Creating and configuring the </a:t>
-            </a:r>
-            <a:r>
-              <a:rPr lang="en-US" noProof="1"/>
-              <a:t>"</a:t>
-            </a:r>
-            <a:r>
-              <a:rPr lang="en-US" noProof="1">
-                <a:solidFill>
-                  <a:schemeClr val="accent5">
-                    <a:lumMod val="20000"/>
-                    <a:lumOff val="80000"/>
-                  </a:schemeClr>
-                </a:solidFill>
-                <a:latin typeface="Consolas" panose="020B0609020204030204" pitchFamily="49" charset="0"/>
-                <a:cs typeface="Consolas" panose="020B0609020204030204" pitchFamily="49" charset="0"/>
-              </a:rPr>
-              <a:t>IIS</a:t>
-            </a:r>
-            <a:r>
-              <a:rPr lang="en-US" noProof="1">
-                <a:solidFill>
-                  <a:schemeClr val="accent5">
-                    <a:lumMod val="20000"/>
-                    <a:lumOff val="80000"/>
-                  </a:schemeClr>
-                </a:solidFill>
-                <a:cs typeface="Consolas" panose="020B0609020204030204" pitchFamily="49" charset="0"/>
-              </a:rPr>
-              <a:t> </a:t>
-            </a:r>
-            <a:r>
-              <a:rPr lang="en-US" noProof="1">
-                <a:solidFill>
-                  <a:schemeClr val="accent5">
-                    <a:lumMod val="20000"/>
-                    <a:lumOff val="80000"/>
-                  </a:schemeClr>
-                </a:solidFill>
-                <a:latin typeface="Consolas" panose="020B0609020204030204" pitchFamily="49" charset="0"/>
-                <a:cs typeface="Consolas" panose="020B0609020204030204" pitchFamily="49" charset="0"/>
-              </a:rPr>
-              <a:t>APPPOOL\DefaultAppPool</a:t>
-            </a:r>
-            <a:r>
-              <a:rPr lang="en-US" noProof="1" smtClean="0"/>
-              <a:t>" in SQL Server</a:t>
+              <a:t>Visual Studio have a Web Publishing wizard</a:t>
+            </a:r>
+          </a:p>
+          <a:p>
+            <a:pPr lvl="1"/>
+            <a:r>
+              <a:rPr lang="en-US" dirty="0" smtClean="0"/>
+              <a:t>Deploys ASP.NET apps to remote IIS</a:t>
             </a:r>
             <a:endParaRPr lang="en-US" dirty="0"/>
           </a:p>
@@ -10429,118 +10506,18 @@
         </p:blipFill>
         <p:spPr>
           <a:xfrm>
-            <a:off x="3235171" y="2209800"/>
-            <a:ext cx="4710898" cy="4229100"/>
+            <a:off x="1960296" y="2362200"/>
+            <a:ext cx="5223408" cy="4098924"/>
           </a:xfrm>
           <a:prstGeom prst="rect">
             <a:avLst/>
           </a:prstGeom>
         </p:spPr>
       </p:pic>
-      <p:pic>
-        <p:nvPicPr>
-          <p:cNvPr id="6" name="Picture 5"/>
-          <p:cNvPicPr>
-            <a:picLocks noChangeAspect="1"/>
-          </p:cNvPicPr>
-          <p:nvPr/>
-        </p:nvPicPr>
-        <p:blipFill>
-          <a:blip r:embed="rId3"/>
-          <a:stretch>
-            <a:fillRect/>
-          </a:stretch>
-        </p:blipFill>
-        <p:spPr>
-          <a:xfrm>
-            <a:off x="609600" y="2895601"/>
-            <a:ext cx="2278364" cy="2943224"/>
-          </a:xfrm>
-          <a:prstGeom prst="rect">
-            <a:avLst/>
-          </a:prstGeom>
-        </p:spPr>
-      </p:pic>
-      <p:pic>
-        <p:nvPicPr>
-          <p:cNvPr id="7" name="Picture 6"/>
-          <p:cNvPicPr>
-            <a:picLocks noChangeAspect="1"/>
-          </p:cNvPicPr>
-          <p:nvPr/>
-        </p:nvPicPr>
-        <p:blipFill rotWithShape="1">
-          <a:blip r:embed="rId4" cstate="screen">
-            <a:extLst>
-              <a:ext uri="{28A0092B-C50C-407E-A947-70E740481C1C}">
-                <a14:useLocalDpi xmlns:a14="http://schemas.microsoft.com/office/drawing/2010/main"/>
-              </a:ext>
-            </a:extLst>
-          </a:blip>
-          <a:srcRect/>
-          <a:stretch/>
-        </p:blipFill>
-        <p:spPr>
-          <a:xfrm>
-            <a:off x="5497178" y="4038600"/>
-            <a:ext cx="2884822" cy="1972405"/>
-          </a:xfrm>
-          <a:prstGeom prst="rect">
-            <a:avLst/>
-          </a:prstGeom>
-          <a:effectLst>
-            <a:outerShdw blurRad="63500" sx="102000" sy="102000" algn="ctr" rotWithShape="0">
-              <a:prstClr val="black">
-                <a:alpha val="40000"/>
-              </a:prstClr>
-            </a:outerShdw>
-          </a:effectLst>
-        </p:spPr>
-      </p:pic>
-      <p:cxnSp>
-        <p:nvCxnSpPr>
-          <p:cNvPr id="8" name="Straight Arrow Connector 7"/>
-          <p:cNvCxnSpPr/>
-          <p:nvPr/>
-        </p:nvCxnSpPr>
-        <p:spPr>
-          <a:xfrm>
-            <a:off x="2860565" y="4366998"/>
-            <a:ext cx="374606" cy="215"/>
-          </a:xfrm>
-          <a:prstGeom prst="straightConnector1">
-            <a:avLst/>
-          </a:prstGeom>
-          <a:ln w="31750">
-            <a:solidFill>
-              <a:schemeClr val="accent5">
-                <a:lumMod val="20000"/>
-                <a:lumOff val="80000"/>
-              </a:schemeClr>
-            </a:solidFill>
-            <a:headEnd type="none"/>
-            <a:tailEnd type="arrow"/>
-          </a:ln>
-        </p:spPr>
-        <p:style>
-          <a:lnRef idx="2">
-            <a:schemeClr val="accent5"/>
-          </a:lnRef>
-          <a:fillRef idx="0">
-            <a:schemeClr val="accent5"/>
-          </a:fillRef>
-          <a:effectRef idx="1">
-            <a:schemeClr val="accent5"/>
-          </a:effectRef>
-          <a:fontRef idx="minor">
-            <a:schemeClr val="tx1"/>
-          </a:fontRef>
-        </p:style>
-      </p:cxnSp>
     </p:spTree>
     <p:extLst>
       <p:ext uri="{BB962C8B-B14F-4D97-AF65-F5344CB8AC3E}">
-        <p14:creationId xmlns:p14="http://schemas.microsoft.com/office/powerpoint/2010/main" val="1759498413"/>
+        <p14:creationId xmlns:p14="http://schemas.microsoft.com/office/powerpoint/2010/main" val="1118804896"/>
       </p:ext>
     </p:extLst>
   </p:cSld>
@@ -10586,497 +10563,6 @@
         </p:nvSpPr>
         <p:spPr>
           <a:xfrm>
-            <a:off x="609600" y="4688417"/>
-            <a:ext cx="7924800" cy="685800"/>
-          </a:xfrm>
-        </p:spPr>
-        <p:txBody>
-          <a:bodyPr/>
-          <a:lstStyle/>
-          <a:p>
-            <a:r>
-              <a:rPr lang="en-US" dirty="0" smtClean="0"/>
-              <a:t>Web Publishing from VS</a:t>
-            </a:r>
-            <a:endParaRPr lang="en-US" dirty="0"/>
-          </a:p>
-        </p:txBody>
-      </p:sp>
-      <p:sp>
-        <p:nvSpPr>
-          <p:cNvPr id="6" name="Subtitle 5"/>
-          <p:cNvSpPr>
-            <a:spLocks noGrp="1"/>
-          </p:cNvSpPr>
-          <p:nvPr>
-            <p:ph type="subTitle" idx="1"/>
-          </p:nvPr>
-        </p:nvSpPr>
-        <p:spPr>
-          <a:xfrm>
-            <a:off x="609600" y="5450680"/>
-            <a:ext cx="7924800" cy="569120"/>
-          </a:xfrm>
-        </p:spPr>
-        <p:txBody>
-          <a:bodyPr/>
-          <a:lstStyle/>
-          <a:p>
-            <a:r>
-              <a:rPr lang="en-US" dirty="0" smtClean="0"/>
-              <a:t>Publish Web App from VS to IIS</a:t>
-            </a:r>
-            <a:endParaRPr lang="en-US" dirty="0"/>
-          </a:p>
-        </p:txBody>
-      </p:sp>
-      <p:pic>
-        <p:nvPicPr>
-          <p:cNvPr id="7" name="Picture 6"/>
-          <p:cNvPicPr>
-            <a:picLocks noChangeAspect="1"/>
-          </p:cNvPicPr>
-          <p:nvPr/>
-        </p:nvPicPr>
-        <p:blipFill>
-          <a:blip r:embed="rId2" cstate="screen">
-            <a:extLst>
-              <a:ext uri="{28A0092B-C50C-407E-A947-70E740481C1C}">
-                <a14:useLocalDpi xmlns:a14="http://schemas.microsoft.com/office/drawing/2010/main"/>
-              </a:ext>
-            </a:extLst>
-          </a:blip>
-          <a:stretch>
-            <a:fillRect/>
-          </a:stretch>
-        </p:blipFill>
-        <p:spPr>
-          <a:xfrm>
-            <a:off x="2450432" y="1524000"/>
-            <a:ext cx="3352800" cy="2631016"/>
-          </a:xfrm>
-          <a:prstGeom prst="rect">
-            <a:avLst/>
-          </a:prstGeom>
-        </p:spPr>
-      </p:pic>
-      <p:grpSp>
-        <p:nvGrpSpPr>
-          <p:cNvPr id="10" name="Group 9"/>
-          <p:cNvGrpSpPr/>
-          <p:nvPr/>
-        </p:nvGrpSpPr>
-        <p:grpSpPr>
-          <a:xfrm>
-            <a:off x="461209" y="2106398"/>
-            <a:ext cx="1530393" cy="1466218"/>
-            <a:chOff x="990600" y="2602706"/>
-            <a:chExt cx="2466975" cy="2363525"/>
-          </a:xfrm>
-        </p:grpSpPr>
-        <p:pic>
-          <p:nvPicPr>
-            <p:cNvPr id="5122" name="Picture 2" descr="http://visualstudiomagazine.com/articles/2013/06/26/~/media/ECG/visualstudiomagazine/Images/introimages/VisualStudio2013.ashx"/>
-            <p:cNvPicPr>
-              <a:picLocks noChangeAspect="1" noChangeArrowheads="1"/>
-            </p:cNvPicPr>
-            <p:nvPr/>
-          </p:nvPicPr>
-          <p:blipFill>
-            <a:blip r:embed="rId3" cstate="screen">
-              <a:extLst>
-                <a:ext uri="{28A0092B-C50C-407E-A947-70E740481C1C}">
-                  <a14:useLocalDpi xmlns:a14="http://schemas.microsoft.com/office/drawing/2010/main"/>
-                </a:ext>
-              </a:extLst>
-            </a:blip>
-            <a:srcRect/>
-            <a:stretch>
-              <a:fillRect/>
-            </a:stretch>
-          </p:blipFill>
-          <p:spPr bwMode="auto">
-            <a:xfrm>
-              <a:off x="990600" y="3250406"/>
-              <a:ext cx="2466975" cy="1715825"/>
-            </a:xfrm>
-            <a:prstGeom prst="rect">
-              <a:avLst/>
-            </a:prstGeom>
-            <a:effectLst>
-              <a:outerShdw blurRad="63500" sx="102000" sy="102000" algn="ctr" rotWithShape="0">
-                <a:prstClr val="black">
-                  <a:alpha val="40000"/>
-                </a:prstClr>
-              </a:outerShdw>
-            </a:effectLst>
-            <a:extLst>
-              <a:ext uri="{909E8E84-426E-40DD-AFC4-6F175D3DCCD1}">
-                <a14:hiddenFill xmlns:a14="http://schemas.microsoft.com/office/drawing/2010/main">
-                  <a:solidFill>
-                    <a:srgbClr val="FFFFFF"/>
-                  </a:solidFill>
-                </a14:hiddenFill>
-              </a:ext>
-            </a:extLst>
-          </p:spPr>
-        </p:pic>
-        <p:pic>
-          <p:nvPicPr>
-            <p:cNvPr id="9" name="Picture 8"/>
-            <p:cNvPicPr>
-              <a:picLocks noChangeAspect="1"/>
-            </p:cNvPicPr>
-            <p:nvPr/>
-          </p:nvPicPr>
-          <p:blipFill>
-            <a:blip r:embed="rId4" cstate="screen">
-              <a:extLst>
-                <a:ext uri="{28A0092B-C50C-407E-A947-70E740481C1C}">
-                  <a14:useLocalDpi xmlns:a14="http://schemas.microsoft.com/office/drawing/2010/main"/>
-                </a:ext>
-              </a:extLst>
-            </a:blip>
-            <a:stretch>
-              <a:fillRect/>
-            </a:stretch>
-          </p:blipFill>
-          <p:spPr>
-            <a:xfrm>
-              <a:off x="990600" y="2602706"/>
-              <a:ext cx="2466975" cy="647700"/>
-            </a:xfrm>
-            <a:prstGeom prst="rect">
-              <a:avLst/>
-            </a:prstGeom>
-            <a:effectLst>
-              <a:outerShdw blurRad="63500" sx="102000" sy="102000" algn="ctr" rotWithShape="0">
-                <a:prstClr val="black">
-                  <a:alpha val="40000"/>
-                </a:prstClr>
-              </a:outerShdw>
-            </a:effectLst>
-          </p:spPr>
-        </p:pic>
-      </p:grpSp>
-      <p:pic>
-        <p:nvPicPr>
-          <p:cNvPr id="12" name="Picture 11"/>
-          <p:cNvPicPr>
-            <a:picLocks noChangeAspect="1"/>
-          </p:cNvPicPr>
-          <p:nvPr/>
-        </p:nvPicPr>
-        <p:blipFill>
-          <a:blip r:embed="rId5" cstate="screen">
-            <a:extLst>
-              <a:ext uri="{28A0092B-C50C-407E-A947-70E740481C1C}">
-                <a14:useLocalDpi xmlns:a14="http://schemas.microsoft.com/office/drawing/2010/main"/>
-              </a:ext>
-            </a:extLst>
-          </a:blip>
-          <a:stretch>
-            <a:fillRect/>
-          </a:stretch>
-        </p:blipFill>
-        <p:spPr>
-          <a:xfrm>
-            <a:off x="6236368" y="2165636"/>
-            <a:ext cx="2425168" cy="1347315"/>
-          </a:xfrm>
-          <a:prstGeom prst="roundRect">
-            <a:avLst>
-              <a:gd name="adj" fmla="val 2632"/>
-            </a:avLst>
-          </a:prstGeom>
-          <a:solidFill>
-            <a:srgbClr val="FFFFFF"/>
-          </a:solidFill>
-          <a:effectLst>
-            <a:outerShdw blurRad="63500" sx="102000" sy="102000" algn="ctr" rotWithShape="0">
-              <a:prstClr val="black">
-                <a:alpha val="40000"/>
-              </a:prstClr>
-            </a:outerShdw>
-          </a:effectLst>
-        </p:spPr>
-      </p:pic>
-      <p:cxnSp>
-        <p:nvCxnSpPr>
-          <p:cNvPr id="13" name="Straight Arrow Connector 12"/>
-          <p:cNvCxnSpPr/>
-          <p:nvPr/>
-        </p:nvCxnSpPr>
-        <p:spPr>
-          <a:xfrm>
-            <a:off x="2039730" y="2827261"/>
-            <a:ext cx="374606" cy="215"/>
-          </a:xfrm>
-          <a:prstGeom prst="straightConnector1">
-            <a:avLst/>
-          </a:prstGeom>
-          <a:ln w="31750">
-            <a:solidFill>
-              <a:schemeClr val="accent5">
-                <a:lumMod val="20000"/>
-                <a:lumOff val="80000"/>
-              </a:schemeClr>
-            </a:solidFill>
-            <a:headEnd type="none"/>
-            <a:tailEnd type="arrow"/>
-          </a:ln>
-        </p:spPr>
-        <p:style>
-          <a:lnRef idx="2">
-            <a:schemeClr val="accent5"/>
-          </a:lnRef>
-          <a:fillRef idx="0">
-            <a:schemeClr val="accent5"/>
-          </a:fillRef>
-          <a:effectRef idx="1">
-            <a:schemeClr val="accent5"/>
-          </a:effectRef>
-          <a:fontRef idx="minor">
-            <a:schemeClr val="tx1"/>
-          </a:fontRef>
-        </p:style>
-      </p:cxnSp>
-      <p:cxnSp>
-        <p:nvCxnSpPr>
-          <p:cNvPr id="15" name="Straight Arrow Connector 14"/>
-          <p:cNvCxnSpPr/>
-          <p:nvPr/>
-        </p:nvCxnSpPr>
-        <p:spPr>
-          <a:xfrm>
-            <a:off x="5827296" y="2827261"/>
-            <a:ext cx="374606" cy="215"/>
-          </a:xfrm>
-          <a:prstGeom prst="straightConnector1">
-            <a:avLst/>
-          </a:prstGeom>
-          <a:ln w="31750">
-            <a:solidFill>
-              <a:schemeClr val="accent5">
-                <a:lumMod val="20000"/>
-                <a:lumOff val="80000"/>
-              </a:schemeClr>
-            </a:solidFill>
-            <a:headEnd type="none"/>
-            <a:tailEnd type="arrow"/>
-          </a:ln>
-        </p:spPr>
-        <p:style>
-          <a:lnRef idx="2">
-            <a:schemeClr val="accent5"/>
-          </a:lnRef>
-          <a:fillRef idx="0">
-            <a:schemeClr val="accent5"/>
-          </a:fillRef>
-          <a:effectRef idx="1">
-            <a:schemeClr val="accent5"/>
-          </a:effectRef>
-          <a:fontRef idx="minor">
-            <a:schemeClr val="tx1"/>
-          </a:fontRef>
-        </p:style>
-      </p:cxnSp>
-    </p:spTree>
-    <p:extLst>
-      <p:ext uri="{BB962C8B-B14F-4D97-AF65-F5344CB8AC3E}">
-        <p14:creationId xmlns:p14="http://schemas.microsoft.com/office/powerpoint/2010/main" val="514934596"/>
-      </p:ext>
-    </p:extLst>
-  </p:cSld>
-  <p:clrMapOvr>
-    <a:masterClrMapping/>
-  </p:clrMapOvr>
-  <p:timing>
-    <p:tnLst>
-      <p:par>
-        <p:cTn id="1" dur="indefinite" restart="never" nodeType="tmRoot"/>
-      </p:par>
-    </p:tnLst>
-  </p:timing>
-</p:sld>
-</file>
-
-<file path=ppt/slides/slide22.xml><?xml version="1.0" encoding="utf-8"?>
-<p:sld xmlns:a="http://schemas.openxmlformats.org/drawingml/2006/main" xmlns:r="http://schemas.openxmlformats.org/officeDocument/2006/relationships" xmlns:p="http://schemas.openxmlformats.org/presentationml/2006/main">
-  <p:cSld>
-    <p:spTree>
-      <p:nvGrpSpPr>
-        <p:cNvPr id="1" name=""/>
-        <p:cNvGrpSpPr/>
-        <p:nvPr/>
-      </p:nvGrpSpPr>
-      <p:grpSpPr>
-        <a:xfrm>
-          <a:off x="0" y="0"/>
-          <a:ext cx="0" cy="0"/>
-          <a:chOff x="0" y="0"/>
-          <a:chExt cx="0" cy="0"/>
-        </a:xfrm>
-      </p:grpSpPr>
-      <p:sp>
-        <p:nvSpPr>
-          <p:cNvPr id="2" name="Title 1"/>
-          <p:cNvSpPr>
-            <a:spLocks noGrp="1"/>
-          </p:cNvSpPr>
-          <p:nvPr>
-            <p:ph type="title"/>
-          </p:nvPr>
-        </p:nvSpPr>
-        <p:spPr/>
-        <p:txBody>
-          <a:bodyPr/>
-          <a:lstStyle/>
-          <a:p>
-            <a:r>
-              <a:rPr lang="en-US" smtClean="0"/>
-              <a:t>Web Publishing </a:t>
-            </a:r>
-            <a:r>
-              <a:rPr lang="en-US" dirty="0" smtClean="0"/>
-              <a:t>in VS</a:t>
-            </a:r>
-            <a:endParaRPr lang="en-US" dirty="0"/>
-          </a:p>
-        </p:txBody>
-      </p:sp>
-      <p:sp>
-        <p:nvSpPr>
-          <p:cNvPr id="3" name="Content Placeholder 2"/>
-          <p:cNvSpPr>
-            <a:spLocks noGrp="1"/>
-          </p:cNvSpPr>
-          <p:nvPr>
-            <p:ph idx="1"/>
-          </p:nvPr>
-        </p:nvSpPr>
-        <p:spPr/>
-        <p:txBody>
-          <a:bodyPr/>
-          <a:lstStyle/>
-          <a:p>
-            <a:r>
-              <a:rPr lang="en-US" dirty="0" smtClean="0"/>
-              <a:t>Visual Studio have a Web Publishing wizard</a:t>
-            </a:r>
-          </a:p>
-          <a:p>
-            <a:pPr lvl="1"/>
-            <a:r>
-              <a:rPr lang="en-US" dirty="0" smtClean="0"/>
-              <a:t>Deploys ASP.NET apps to remote IIS</a:t>
-            </a:r>
-            <a:endParaRPr lang="en-US" dirty="0"/>
-          </a:p>
-        </p:txBody>
-      </p:sp>
-      <p:sp>
-        <p:nvSpPr>
-          <p:cNvPr id="4" name="Slide Number Placeholder 3"/>
-          <p:cNvSpPr>
-            <a:spLocks noGrp="1"/>
-          </p:cNvSpPr>
-          <p:nvPr>
-            <p:ph type="sldNum" sz="quarter" idx="10"/>
-          </p:nvPr>
-        </p:nvSpPr>
-        <p:spPr/>
-        <p:txBody>
-          <a:bodyPr/>
-          <a:lstStyle/>
-          <a:p>
-            <a:pPr>
-              <a:defRPr/>
-            </a:pPr>
-            <a:fld id="{58452FF4-89E3-4D1B-9927-2DBDC00E58D7}" type="slidenum">
-              <a:rPr lang="en-US" smtClean="0"/>
-              <a:pPr>
-                <a:defRPr/>
-              </a:pPr>
-              <a:t>22</a:t>
-            </a:fld>
-            <a:endParaRPr lang="en-US" dirty="0"/>
-          </a:p>
-        </p:txBody>
-      </p:sp>
-      <p:pic>
-        <p:nvPicPr>
-          <p:cNvPr id="5" name="Picture 4"/>
-          <p:cNvPicPr>
-            <a:picLocks noChangeAspect="1"/>
-          </p:cNvPicPr>
-          <p:nvPr/>
-        </p:nvPicPr>
-        <p:blipFill>
-          <a:blip r:embed="rId2"/>
-          <a:stretch>
-            <a:fillRect/>
-          </a:stretch>
-        </p:blipFill>
-        <p:spPr>
-          <a:xfrm>
-            <a:off x="1960296" y="2362200"/>
-            <a:ext cx="5223408" cy="4098924"/>
-          </a:xfrm>
-          <a:prstGeom prst="rect">
-            <a:avLst/>
-          </a:prstGeom>
-        </p:spPr>
-      </p:pic>
-    </p:spTree>
-    <p:extLst>
-      <p:ext uri="{BB962C8B-B14F-4D97-AF65-F5344CB8AC3E}">
-        <p14:creationId xmlns:p14="http://schemas.microsoft.com/office/powerpoint/2010/main" val="1118804896"/>
-      </p:ext>
-    </p:extLst>
-  </p:cSld>
-  <p:clrMapOvr>
-    <a:masterClrMapping/>
-  </p:clrMapOvr>
-  <p:timing>
-    <p:tnLst>
-      <p:par>
-        <p:cTn id="1" dur="indefinite" restart="never" nodeType="tmRoot"/>
-      </p:par>
-    </p:tnLst>
-  </p:timing>
-</p:sld>
-</file>
-
-<file path=ppt/slides/slide23.xml><?xml version="1.0" encoding="utf-8"?>
-<p:sld xmlns:a="http://schemas.openxmlformats.org/drawingml/2006/main" xmlns:r="http://schemas.openxmlformats.org/officeDocument/2006/relationships" xmlns:p="http://schemas.openxmlformats.org/presentationml/2006/main">
-  <p:cSld>
-    <p:spTree>
-      <p:nvGrpSpPr>
-        <p:cNvPr id="1" name=""/>
-        <p:cNvGrpSpPr/>
-        <p:nvPr/>
-      </p:nvGrpSpPr>
-      <p:grpSpPr>
-        <a:xfrm>
-          <a:off x="0" y="0"/>
-          <a:ext cx="0" cy="0"/>
-          <a:chOff x="0" y="0"/>
-          <a:chExt cx="0" cy="0"/>
-        </a:xfrm>
-      </p:grpSpPr>
-      <p:sp>
-        <p:nvSpPr>
-          <p:cNvPr id="5" name="Title 4"/>
-          <p:cNvSpPr>
-            <a:spLocks noGrp="1"/>
-          </p:cNvSpPr>
-          <p:nvPr>
-            <p:ph type="ctrTitle"/>
-          </p:nvPr>
-        </p:nvSpPr>
-        <p:spPr>
-          <a:xfrm>
             <a:off x="609600" y="1447800"/>
             <a:ext cx="7924800" cy="685800"/>
           </a:xfrm>
@@ -11148,147 +10634,6 @@
           <a:prstGeom prst="rect">
             <a:avLst/>
           </a:prstGeom>
-        </p:spPr>
-      </p:pic>
-      <p:grpSp>
-        <p:nvGrpSpPr>
-          <p:cNvPr id="10" name="Group 9"/>
-          <p:cNvGrpSpPr/>
-          <p:nvPr/>
-        </p:nvGrpSpPr>
-        <p:grpSpPr>
-          <a:xfrm>
-            <a:off x="461209" y="3858998"/>
-            <a:ext cx="1530393" cy="1466218"/>
-            <a:chOff x="990600" y="2602706"/>
-            <a:chExt cx="2466975" cy="2363525"/>
-          </a:xfrm>
-        </p:grpSpPr>
-        <p:pic>
-          <p:nvPicPr>
-            <p:cNvPr id="11" name="Picture 2" descr="http://visualstudiomagazine.com/articles/2013/06/26/~/media/ECG/visualstudiomagazine/Images/introimages/VisualStudio2013.ashx"/>
-            <p:cNvPicPr>
-              <a:picLocks noChangeAspect="1" noChangeArrowheads="1"/>
-            </p:cNvPicPr>
-            <p:nvPr/>
-          </p:nvPicPr>
-          <p:blipFill>
-            <a:blip r:embed="rId3" cstate="screen">
-              <a:extLst>
-                <a:ext uri="{28A0092B-C50C-407E-A947-70E740481C1C}">
-                  <a14:useLocalDpi xmlns:a14="http://schemas.microsoft.com/office/drawing/2010/main"/>
-                </a:ext>
-              </a:extLst>
-            </a:blip>
-            <a:srcRect/>
-            <a:stretch>
-              <a:fillRect/>
-            </a:stretch>
-          </p:blipFill>
-          <p:spPr bwMode="auto">
-            <a:xfrm>
-              <a:off x="990600" y="3250406"/>
-              <a:ext cx="2466975" cy="1715825"/>
-            </a:xfrm>
-            <a:prstGeom prst="rect">
-              <a:avLst/>
-            </a:prstGeom>
-            <a:effectLst>
-              <a:outerShdw blurRad="63500" sx="102000" sy="102000" algn="ctr" rotWithShape="0">
-                <a:prstClr val="black">
-                  <a:alpha val="40000"/>
-                </a:prstClr>
-              </a:outerShdw>
-            </a:effectLst>
-            <a:extLst>
-              <a:ext uri="{909E8E84-426E-40DD-AFC4-6F175D3DCCD1}">
-                <a14:hiddenFill xmlns:a14="http://schemas.microsoft.com/office/drawing/2010/main">
-                  <a:solidFill>
-                    <a:srgbClr val="FFFFFF"/>
-                  </a:solidFill>
-                </a14:hiddenFill>
-              </a:ext>
-            </a:extLst>
-          </p:spPr>
-        </p:pic>
-        <p:pic>
-          <p:nvPicPr>
-            <p:cNvPr id="12" name="Picture 11"/>
-            <p:cNvPicPr>
-              <a:picLocks noChangeAspect="1"/>
-            </p:cNvPicPr>
-            <p:nvPr/>
-          </p:nvPicPr>
-          <p:blipFill>
-            <a:blip r:embed="rId4" cstate="screen">
-              <a:extLst>
-                <a:ext uri="{28A0092B-C50C-407E-A947-70E740481C1C}">
-                  <a14:useLocalDpi xmlns:a14="http://schemas.microsoft.com/office/drawing/2010/main"/>
-                </a:ext>
-              </a:extLst>
-            </a:blip>
-            <a:stretch>
-              <a:fillRect/>
-            </a:stretch>
-          </p:blipFill>
-          <p:spPr>
-            <a:xfrm>
-              <a:off x="990600" y="2602706"/>
-              <a:ext cx="2466975" cy="647700"/>
-            </a:xfrm>
-            <a:prstGeom prst="rect">
-              <a:avLst/>
-            </a:prstGeom>
-            <a:effectLst>
-              <a:outerShdw blurRad="63500" sx="102000" sy="102000" algn="ctr" rotWithShape="0">
-                <a:prstClr val="black">
-                  <a:alpha val="40000"/>
-                </a:prstClr>
-              </a:outerShdw>
-            </a:effectLst>
-          </p:spPr>
-        </p:pic>
-      </p:grpSp>
-      <p:pic>
-        <p:nvPicPr>
-          <p:cNvPr id="13" name="Picture 12"/>
-          <p:cNvPicPr>
-            <a:picLocks noChangeAspect="1"/>
-          </p:cNvPicPr>
-          <p:nvPr/>
-        </p:nvPicPr>
-        <p:blipFill>
-          <a:blip r:embed="rId5" cstate="screen">
-            <a:extLst>
-              <a:ext uri="{28A0092B-C50C-407E-A947-70E740481C1C}">
-                <a14:useLocalDpi xmlns:a14="http://schemas.microsoft.com/office/drawing/2010/main"/>
-              </a:ext>
-            </a:extLst>
-          </a:blip>
-          <a:stretch>
-            <a:fillRect/>
-          </a:stretch>
-        </p:blipFill>
-        <p:spPr>
-          <a:xfrm>
-            <a:off x="6236368" y="3918236"/>
-            <a:ext cx="2425168" cy="1347315"/>
-          </a:xfrm>
-          <a:prstGeom prst="roundRect">
-            <a:avLst>
-              <a:gd name="adj" fmla="val 2632"/>
-            </a:avLst>
-          </a:prstGeom>
-          <a:solidFill>
-            <a:srgbClr val="FFFFFF"/>
-          </a:solidFill>
-          <a:effectLst>
-            <a:outerShdw blurRad="63500" sx="102000" sy="102000" algn="ctr" rotWithShape="0">
-              <a:prstClr val="black">
-                <a:alpha val="40000"/>
-              </a:prstClr>
-            </a:outerShdw>
-          </a:effectLst>
         </p:spPr>
       </p:pic>
       <p:cxnSp>
@@ -11380,7 +10725,7 @@
           <p:nvPr/>
         </p:nvPicPr>
         <p:blipFill rotWithShape="1">
-          <a:blip r:embed="rId6" cstate="screen">
+          <a:blip r:embed="rId3" cstate="screen">
             <a:extLst>
               <a:ext uri="{28A0092B-C50C-407E-A947-70E740481C1C}">
                 <a14:useLocalDpi xmlns:a14="http://schemas.microsoft.com/office/drawing/2010/main"/>
@@ -11426,6 +10771,88 @@
           </a:sp3d>
         </p:spPr>
       </p:pic>
+      <p:pic>
+        <p:nvPicPr>
+          <p:cNvPr id="16" name="Picture 2" descr="https://static.devexpress.com/Newsletter/2015-07-Visual-Studio/visual-studio-2015-logo-hr2.png"/>
+          <p:cNvPicPr>
+            <a:picLocks noChangeAspect="1" noChangeArrowheads="1"/>
+          </p:cNvPicPr>
+          <p:nvPr/>
+        </p:nvPicPr>
+        <p:blipFill>
+          <a:blip r:embed="rId4" cstate="print">
+            <a:extLst>
+              <a:ext uri="{28A0092B-C50C-407E-A947-70E740481C1C}">
+                <a14:useLocalDpi xmlns:a14="http://schemas.microsoft.com/office/drawing/2010/main" val="0"/>
+              </a:ext>
+            </a:extLst>
+          </a:blip>
+          <a:srcRect/>
+          <a:stretch>
+            <a:fillRect/>
+          </a:stretch>
+        </p:blipFill>
+        <p:spPr bwMode="auto">
+          <a:xfrm>
+            <a:off x="310722" y="4223504"/>
+            <a:ext cx="1710506" cy="712711"/>
+          </a:xfrm>
+          <a:prstGeom prst="rect">
+            <a:avLst/>
+          </a:prstGeom>
+          <a:noFill/>
+          <a:extLst>
+            <a:ext uri="{909E8E84-426E-40DD-AFC4-6F175D3DCCD1}">
+              <a14:hiddenFill xmlns:a14="http://schemas.microsoft.com/office/drawing/2010/main">
+                <a:solidFill>
+                  <a:srgbClr val="FFFFFF"/>
+                </a:solidFill>
+              </a14:hiddenFill>
+            </a:ext>
+          </a:extLst>
+        </p:spPr>
+      </p:pic>
+      <p:pic>
+        <p:nvPicPr>
+          <p:cNvPr id="17" name="Picture 2" descr="http://asphostportal.com/img/icon-iis.png"/>
+          <p:cNvPicPr>
+            <a:picLocks noChangeAspect="1" noChangeArrowheads="1"/>
+          </p:cNvPicPr>
+          <p:nvPr/>
+        </p:nvPicPr>
+        <p:blipFill>
+          <a:blip r:embed="rId5" cstate="print">
+            <a:extLst>
+              <a:ext uri="{28A0092B-C50C-407E-A947-70E740481C1C}">
+                <a14:useLocalDpi xmlns:a14="http://schemas.microsoft.com/office/drawing/2010/main" val="0"/>
+              </a:ext>
+            </a:extLst>
+          </a:blip>
+          <a:srcRect/>
+          <a:stretch>
+            <a:fillRect/>
+          </a:stretch>
+        </p:blipFill>
+        <p:spPr bwMode="auto">
+          <a:xfrm>
+            <a:off x="6232436" y="3907954"/>
+            <a:ext cx="2513217" cy="1368307"/>
+          </a:xfrm>
+          <a:prstGeom prst="rect">
+            <a:avLst/>
+          </a:prstGeom>
+          <a:noFill/>
+          <a:extLst>
+            <a:ext uri="{909E8E84-426E-40DD-AFC4-6F175D3DCCD1}">
+              <a14:hiddenFill xmlns:a14="http://schemas.microsoft.com/office/drawing/2010/main">
+                <a:solidFill>
+                  <a:srgbClr val="FFFFFF"/>
+                </a:solidFill>
+              </a14:hiddenFill>
+            </a:ext>
+          </a:extLst>
+        </p:spPr>
+      </p:pic>
     </p:spTree>
     <p:extLst>
       <p:ext uri="{BB962C8B-B14F-4D97-AF65-F5344CB8AC3E}">
@@ -11446,7 +10873,7 @@
 </p:sld>
 </file>
 
-<file path=ppt/slides/slide24.xml><?xml version="1.0" encoding="utf-8"?>
+<file path=ppt/slides/slide22.xml><?xml version="1.0" encoding="utf-8"?>
 <p:sld xmlns:a="http://schemas.openxmlformats.org/drawingml/2006/main" xmlns:r="http://schemas.openxmlformats.org/officeDocument/2006/relationships" xmlns:p="http://schemas.openxmlformats.org/presentationml/2006/main">
   <p:cSld>
     <p:spTree>
@@ -11513,11 +10940,7 @@
           <a:p>
             <a:r>
               <a:rPr lang="en-US" dirty="0" smtClean="0"/>
-              <a:t>Live </a:t>
-            </a:r>
-            <a:r>
-              <a:rPr lang="en-US" dirty="0" smtClean="0"/>
-              <a:t>Demo</a:t>
+              <a:t>Live Demo</a:t>
             </a:r>
             <a:br>
               <a:rPr lang="en-US" dirty="0" smtClean="0"/>
@@ -11560,105 +10983,6 @@
           </a:prstGeom>
         </p:spPr>
       </p:pic>
-      <p:grpSp>
-        <p:nvGrpSpPr>
-          <p:cNvPr id="10" name="Group 9"/>
-          <p:cNvGrpSpPr/>
-          <p:nvPr/>
-        </p:nvGrpSpPr>
-        <p:grpSpPr>
-          <a:xfrm>
-            <a:off x="461209" y="3858998"/>
-            <a:ext cx="1530393" cy="1466218"/>
-            <a:chOff x="990600" y="2602706"/>
-            <a:chExt cx="2466975" cy="2363525"/>
-          </a:xfrm>
-        </p:grpSpPr>
-        <p:pic>
-          <p:nvPicPr>
-            <p:cNvPr id="11" name="Picture 2" descr="http://visualstudiomagazine.com/articles/2013/06/26/~/media/ECG/visualstudiomagazine/Images/introimages/VisualStudio2013.ashx"/>
-            <p:cNvPicPr>
-              <a:picLocks noChangeAspect="1" noChangeArrowheads="1"/>
-            </p:cNvPicPr>
-            <p:nvPr/>
-          </p:nvPicPr>
-          <p:blipFill>
-            <a:blip r:embed="rId3" cstate="screen">
-              <a:extLst>
-                <a:ext uri="{28A0092B-C50C-407E-A947-70E740481C1C}">
-                  <a14:useLocalDpi xmlns:a14="http://schemas.microsoft.com/office/drawing/2010/main"/>
-                </a:ext>
-              </a:extLst>
-            </a:blip>
-            <a:srcRect/>
-            <a:stretch>
-              <a:fillRect/>
-            </a:stretch>
-          </p:blipFill>
-          <p:spPr bwMode="auto">
-            <a:xfrm>
-              <a:off x="990600" y="3250406"/>
-              <a:ext cx="2466975" cy="1715825"/>
-            </a:xfrm>
-            <a:prstGeom prst="rect">
-              <a:avLst/>
-            </a:prstGeom>
-            <a:effectLst>
-              <a:outerShdw blurRad="63500" sx="102000" sy="102000" algn="ctr" rotWithShape="0">
-                <a:prstClr val="black">
-                  <a:alpha val="40000"/>
-                </a:prstClr>
-              </a:outerShdw>
-            </a:effectLst>
-            <a:extLst>
-              <a:ext uri="{909E8E84-426E-40DD-AFC4-6F175D3DCCD1}">
-                <a14:hiddenFill xmlns:a14="http://schemas.microsoft.com/office/drawing/2010/main">
-                  <a:solidFill>
-                    <a:srgbClr val="FFFFFF"/>
-                  </a:solidFill>
-                </a14:hiddenFill>
-              </a:ext>
-            </a:extLst>
-          </p:spPr>
-        </p:pic>
-        <p:pic>
-          <p:nvPicPr>
-            <p:cNvPr id="12" name="Picture 11"/>
-            <p:cNvPicPr>
-              <a:picLocks noChangeAspect="1"/>
-            </p:cNvPicPr>
-            <p:nvPr/>
-          </p:nvPicPr>
-          <p:blipFill>
-            <a:blip r:embed="rId4" cstate="screen">
-              <a:extLst>
-                <a:ext uri="{28A0092B-C50C-407E-A947-70E740481C1C}">
-                  <a14:useLocalDpi xmlns:a14="http://schemas.microsoft.com/office/drawing/2010/main"/>
-                </a:ext>
-              </a:extLst>
-            </a:blip>
-            <a:stretch>
-              <a:fillRect/>
-            </a:stretch>
-          </p:blipFill>
-          <p:spPr>
-            <a:xfrm>
-              <a:off x="990600" y="2602706"/>
-              <a:ext cx="2466975" cy="647700"/>
-            </a:xfrm>
-            <a:prstGeom prst="rect">
-              <a:avLst/>
-            </a:prstGeom>
-            <a:effectLst>
-              <a:outerShdw blurRad="63500" sx="102000" sy="102000" algn="ctr" rotWithShape="0">
-                <a:prstClr val="black">
-                  <a:alpha val="40000"/>
-                </a:prstClr>
-              </a:outerShdw>
-            </a:effectLst>
-          </p:spPr>
-        </p:pic>
-      </p:grpSp>
       <p:cxnSp>
         <p:nvCxnSpPr>
           <p:cNvPr id="14" name="Straight Arrow Connector 13"/>
@@ -11748,7 +11072,7 @@
           <p:nvPr/>
         </p:nvPicPr>
         <p:blipFill rotWithShape="1">
-          <a:blip r:embed="rId5" cstate="screen">
+          <a:blip r:embed="rId3" cstate="screen">
             <a:extLst>
               <a:ext uri="{28A0092B-C50C-407E-A947-70E740481C1C}">
                 <a14:useLocalDpi xmlns:a14="http://schemas.microsoft.com/office/drawing/2010/main"/>
@@ -11803,7 +11127,7 @@
           <p:nvPr/>
         </p:nvPicPr>
         <p:blipFill rotWithShape="1">
-          <a:blip r:embed="rId6" cstate="print">
+          <a:blip r:embed="rId4" cstate="print">
             <a:extLst>
               <a:ext uri="{28A0092B-C50C-407E-A947-70E740481C1C}">
                 <a14:useLocalDpi xmlns:a14="http://schemas.microsoft.com/office/drawing/2010/main" val="0"/>
@@ -11833,6 +11157,47 @@
           </a:extLst>
         </p:spPr>
       </p:pic>
+      <p:pic>
+        <p:nvPicPr>
+          <p:cNvPr id="2" name="Picture 2" descr="https://static.devexpress.com/Newsletter/2015-07-Visual-Studio/visual-studio-2015-logo-hr2.png"/>
+          <p:cNvPicPr>
+            <a:picLocks noChangeAspect="1" noChangeArrowheads="1"/>
+          </p:cNvPicPr>
+          <p:nvPr/>
+        </p:nvPicPr>
+        <p:blipFill>
+          <a:blip r:embed="rId5" cstate="print">
+            <a:extLst>
+              <a:ext uri="{28A0092B-C50C-407E-A947-70E740481C1C}">
+                <a14:useLocalDpi xmlns:a14="http://schemas.microsoft.com/office/drawing/2010/main" val="0"/>
+              </a:ext>
+            </a:extLst>
+          </a:blip>
+          <a:srcRect/>
+          <a:stretch>
+            <a:fillRect/>
+          </a:stretch>
+        </p:blipFill>
+        <p:spPr bwMode="auto">
+          <a:xfrm>
+            <a:off x="310722" y="4223504"/>
+            <a:ext cx="1710506" cy="712711"/>
+          </a:xfrm>
+          <a:prstGeom prst="rect">
+            <a:avLst/>
+          </a:prstGeom>
+          <a:noFill/>
+          <a:extLst>
+            <a:ext uri="{909E8E84-426E-40DD-AFC4-6F175D3DCCD1}">
+              <a14:hiddenFill xmlns:a14="http://schemas.microsoft.com/office/drawing/2010/main">
+                <a:solidFill>
+                  <a:srgbClr val="FFFFFF"/>
+                </a:solidFill>
+              </a14:hiddenFill>
+            </a:ext>
+          </a:extLst>
+        </p:spPr>
+      </p:pic>
     </p:spTree>
     <p:extLst>
       <p:ext uri="{BB962C8B-B14F-4D97-AF65-F5344CB8AC3E}">
@@ -11853,7 +11218,7 @@
 </p:sld>
 </file>
 
-<file path=ppt/slides/slide25.xml><?xml version="1.0" encoding="utf-8"?>
+<file path=ppt/slides/slide23.xml><?xml version="1.0" encoding="utf-8"?>
 <p:sld xmlns:a="http://schemas.openxmlformats.org/drawingml/2006/main" xmlns:r="http://schemas.openxmlformats.org/officeDocument/2006/relationships" xmlns:p="http://schemas.openxmlformats.org/presentationml/2006/main">
   <p:cSld>
     <p:spTree>
@@ -11891,8 +11256,12 @@
           <a:lstStyle/>
           <a:p>
             <a:r>
+              <a:rPr lang="en-US" dirty="0" smtClean="0"/>
+              <a:t>IIS and Azure Deployment of </a:t>
+            </a:r>
+            <a:r>
               <a:rPr lang="en-US" dirty="0"/>
-              <a:t>IIS and Deployment of ASP.NET Applications</a:t>
+              <a:t>ASP.NET Applications</a:t>
             </a:r>
           </a:p>
         </p:txBody>
@@ -11947,236 +11316,7 @@
 </p:sld>
 </file>
 
-<file path=ppt/slides/slide26.xml><?xml version="1.0" encoding="utf-8"?>
-<p:sld xmlns:a="http://schemas.openxmlformats.org/drawingml/2006/main" xmlns:r="http://schemas.openxmlformats.org/officeDocument/2006/relationships" xmlns:p="http://schemas.openxmlformats.org/presentationml/2006/main" show="0">
-  <p:cSld>
-    <p:spTree>
-      <p:nvGrpSpPr>
-        <p:cNvPr id="1" name=""/>
-        <p:cNvGrpSpPr/>
-        <p:nvPr/>
-      </p:nvGrpSpPr>
-      <p:grpSpPr>
-        <a:xfrm>
-          <a:off x="0" y="0"/>
-          <a:ext cx="0" cy="0"/>
-          <a:chOff x="0" y="0"/>
-          <a:chExt cx="0" cy="0"/>
-        </a:xfrm>
-      </p:grpSpPr>
-      <p:sp>
-        <p:nvSpPr>
-          <p:cNvPr id="544770" name="Rectangle 2"/>
-          <p:cNvSpPr>
-            <a:spLocks noGrp="1" noChangeArrowheads="1"/>
-          </p:cNvSpPr>
-          <p:nvPr>
-            <p:ph type="title"/>
-          </p:nvPr>
-        </p:nvSpPr>
-        <p:spPr/>
-        <p:txBody>
-          <a:bodyPr/>
-          <a:lstStyle/>
-          <a:p>
-            <a:r>
-              <a:rPr lang="en-US" dirty="0" smtClean="0"/>
-              <a:t>Homework</a:t>
-            </a:r>
-            <a:endParaRPr lang="bg-BG" dirty="0"/>
-          </a:p>
-        </p:txBody>
-      </p:sp>
-      <p:sp>
-        <p:nvSpPr>
-          <p:cNvPr id="544771" name="Rectangle 3"/>
-          <p:cNvSpPr>
-            <a:spLocks noGrp="1" noChangeArrowheads="1"/>
-          </p:cNvSpPr>
-          <p:nvPr>
-            <p:ph idx="1"/>
-          </p:nvPr>
-        </p:nvSpPr>
-        <p:spPr>
-          <a:xfrm>
-            <a:off x="228600" y="990600"/>
-            <a:ext cx="8686800" cy="5638800"/>
-          </a:xfrm>
-        </p:spPr>
-        <p:txBody>
-          <a:bodyPr/>
-          <a:lstStyle/>
-          <a:p>
-            <a:pPr marL="361950" indent="-361950">
-              <a:lnSpc>
-                <a:spcPts val="3700"/>
-              </a:lnSpc>
-              <a:buFontTx/>
-              <a:buAutoNum type="arabicPeriod"/>
-              <a:tabLst/>
-            </a:pPr>
-            <a:r>
-              <a:rPr lang="en-US" sz="2800" dirty="0" smtClean="0"/>
-              <a:t>Deploy a simple ASPX web page (without a database) in IIS manually (don't use any tool).</a:t>
-            </a:r>
-          </a:p>
-          <a:p>
-            <a:pPr marL="361950" indent="-361950">
-              <a:lnSpc>
-                <a:spcPts val="3700"/>
-              </a:lnSpc>
-              <a:buFontTx/>
-              <a:buAutoNum type="arabicPeriod"/>
-              <a:tabLst/>
-            </a:pPr>
-            <a:r>
-              <a:rPr lang="en-US" sz="2800" dirty="0" smtClean="0"/>
-              <a:t>Create an ASP.NET Web application that displays some data from the </a:t>
-            </a:r>
-            <a:r>
-              <a:rPr lang="en-US" sz="2800" noProof="1" smtClean="0">
-                <a:solidFill>
-                  <a:schemeClr val="accent5">
-                    <a:lumMod val="20000"/>
-                    <a:lumOff val="80000"/>
-                  </a:schemeClr>
-                </a:solidFill>
-                <a:latin typeface="Consolas" panose="020B0609020204030204" pitchFamily="49" charset="0"/>
-                <a:cs typeface="Consolas" panose="020B0609020204030204" pitchFamily="49" charset="0"/>
-              </a:rPr>
-              <a:t>Northwind</a:t>
-            </a:r>
-            <a:r>
-              <a:rPr lang="en-US" sz="2800" dirty="0" smtClean="0"/>
-              <a:t> database. Deploy the application is IIS through Visual Studio.</a:t>
-            </a:r>
-          </a:p>
-          <a:p>
-            <a:pPr marL="361950" indent="-361950">
-              <a:lnSpc>
-                <a:spcPts val="3700"/>
-              </a:lnSpc>
-              <a:buFontTx/>
-              <a:buAutoNum type="arabicPeriod"/>
-              <a:tabLst/>
-            </a:pPr>
-            <a:r>
-              <a:rPr lang="en-US" sz="2800" dirty="0" smtClean="0"/>
-              <a:t>* Create </a:t>
-            </a:r>
-            <a:r>
-              <a:rPr lang="en-US" sz="2800" dirty="0"/>
-              <a:t>a Web </a:t>
-            </a:r>
-            <a:r>
-              <a:rPr lang="en-US" sz="2800" dirty="0" smtClean="0"/>
-              <a:t>app in IIS </a:t>
-            </a:r>
-            <a:r>
-              <a:rPr lang="en-US" sz="2800" dirty="0"/>
-              <a:t>which </a:t>
-            </a:r>
-            <a:r>
-              <a:rPr lang="en-US" sz="2800" dirty="0" smtClean="0"/>
-              <a:t>saves an empty </a:t>
-            </a:r>
-            <a:r>
-              <a:rPr lang="en-US" sz="2800" dirty="0"/>
-              <a:t>file in </a:t>
-            </a:r>
-            <a:r>
-              <a:rPr lang="en-US" sz="2800" dirty="0" smtClean="0">
-                <a:solidFill>
-                  <a:schemeClr val="accent5">
-                    <a:lumMod val="20000"/>
-                    <a:lumOff val="80000"/>
-                  </a:schemeClr>
-                </a:solidFill>
-              </a:rPr>
-              <a:t>C:\WINDOWS </a:t>
-            </a:r>
-            <a:r>
-              <a:rPr lang="en-US" sz="2800" dirty="0" smtClean="0"/>
-              <a:t>directory</a:t>
-            </a:r>
-            <a:r>
-              <a:rPr lang="en-US" sz="2800" dirty="0"/>
-              <a:t>. Configure </a:t>
-            </a:r>
-            <a:r>
-              <a:rPr lang="en-US" sz="2800" dirty="0" smtClean="0"/>
-              <a:t>the IIS and directory </a:t>
-            </a:r>
-            <a:r>
-              <a:rPr lang="en-US" sz="2800" dirty="0"/>
-              <a:t>security so </a:t>
-            </a:r>
-            <a:r>
-              <a:rPr lang="en-US" sz="2800" dirty="0" smtClean="0"/>
-              <a:t>that the IIS </a:t>
-            </a:r>
-            <a:r>
-              <a:rPr lang="en-US" sz="2800" dirty="0"/>
-              <a:t>process </a:t>
-            </a:r>
-            <a:r>
-              <a:rPr lang="en-US" sz="2800" dirty="0" smtClean="0"/>
-              <a:t>has sufficient permissions to write in this directory.</a:t>
-            </a:r>
-          </a:p>
-        </p:txBody>
-      </p:sp>
-      <p:sp>
-        <p:nvSpPr>
-          <p:cNvPr id="4" name="Slide Number Placeholder 3"/>
-          <p:cNvSpPr>
-            <a:spLocks noGrp="1"/>
-          </p:cNvSpPr>
-          <p:nvPr>
-            <p:ph type="sldNum" sz="quarter" idx="10"/>
-          </p:nvPr>
-        </p:nvSpPr>
-        <p:spPr/>
-        <p:txBody>
-          <a:bodyPr/>
-          <a:lstStyle/>
-          <a:p>
-            <a:pPr>
-              <a:defRPr/>
-            </a:pPr>
-            <a:fld id="{58452FF4-89E3-4D1B-9927-2DBDC00E58D7}" type="slidenum">
-              <a:rPr lang="en-US" smtClean="0"/>
-              <a:pPr>
-                <a:defRPr/>
-              </a:pPr>
-              <a:t>26</a:t>
-            </a:fld>
-            <a:endParaRPr lang="en-US" dirty="0"/>
-          </a:p>
-        </p:txBody>
-      </p:sp>
-    </p:spTree>
-    <p:extLst>
-      <p:ext uri="{BB962C8B-B14F-4D97-AF65-F5344CB8AC3E}">
-        <p14:creationId xmlns:p14="http://schemas.microsoft.com/office/powerpoint/2010/main" val="1012186657"/>
-      </p:ext>
-    </p:extLst>
-  </p:cSld>
-  <p:clrMapOvr>
-    <a:masterClrMapping/>
-  </p:clrMapOvr>
-  <p:transition/>
-  <p:timing>
-    <p:tnLst>
-      <p:par>
-        <p:cTn id="1" dur="indefinite" restart="never" nodeType="tmRoot"/>
-      </p:par>
-    </p:tnLst>
-  </p:timing>
-</p:sld>
-</file>
-
-<file path=ppt/slides/slide27.xml><?xml version="1.0" encoding="utf-8"?>
+<file path=ppt/slides/slide24.xml><?xml version="1.0" encoding="utf-8"?>
 <p:sld xmlns:a="http://schemas.openxmlformats.org/drawingml/2006/main" xmlns:r="http://schemas.openxmlformats.org/officeDocument/2006/relationships" xmlns:p="http://schemas.openxmlformats.org/presentationml/2006/main">
   <p:cSld>
     <p:spTree>
@@ -12693,7 +11833,7 @@
         </p:nvSpPr>
         <p:spPr>
           <a:xfrm>
-            <a:off x="457200" y="4177802"/>
+            <a:off x="457200" y="4495800"/>
             <a:ext cx="8229600" cy="1600200"/>
           </a:xfrm>
         </p:spPr>
@@ -12703,40 +11843,20 @@
           <a:p>
             <a:pPr>
               <a:lnSpc>
-                <a:spcPct val="100000"/>
+                <a:spcPct val="110000"/>
               </a:lnSpc>
+              <a:tabLst/>
             </a:pPr>
             <a:r>
-              <a:rPr lang="en-US" dirty="0"/>
-              <a:t>Internet Information </a:t>
-            </a:r>
-            <a:r>
-              <a:rPr lang="en-US" dirty="0" smtClean="0"/>
-              <a:t>Services </a:t>
-            </a:r>
-            <a:r>
-              <a:rPr lang="en-US" dirty="0"/>
-              <a:t>(IIS </a:t>
-            </a:r>
-            <a:r>
-              <a:rPr lang="en-US" dirty="0" smtClean="0"/>
-              <a:t>6.0 </a:t>
-            </a:r>
-            <a:r>
-              <a:rPr lang="en-US" dirty="0"/>
-              <a:t>/ </a:t>
-            </a:r>
-            <a:r>
-              <a:rPr lang="en-US" dirty="0" smtClean="0"/>
-              <a:t>7.0 / 7.5 / 8.0)</a:t>
-            </a:r>
-            <a:endParaRPr lang="bg-BG" dirty="0"/>
+              <a:rPr lang="en-US" sz="5400" dirty="0"/>
+              <a:t>What is IIS?</a:t>
+            </a:r>
           </a:p>
         </p:txBody>
       </p:sp>
       <p:pic>
         <p:nvPicPr>
-          <p:cNvPr id="2050" name="Picture 2" descr="http://microsoftfeed.com/wp-content/uploads/2011/01/Web-Farm-Framework-2.0-for-IIS-7-Released.jpg"/>
+          <p:cNvPr id="2" name="Picture 2" descr="http://www.loadbalancer.org/public/images/articles/2015/07/microsoft-logo.png"/>
           <p:cNvPicPr>
             <a:picLocks noChangeAspect="1" noChangeArrowheads="1"/>
           </p:cNvPicPr>
@@ -12746,7 +11866,7 @@
           <a:blip r:embed="rId3">
             <a:extLst>
               <a:ext uri="{28A0092B-C50C-407E-A947-70E740481C1C}">
-                <a14:useLocalDpi xmlns:a14="http://schemas.microsoft.com/office/drawing/2010/main"/>
+                <a14:useLocalDpi xmlns:a14="http://schemas.microsoft.com/office/drawing/2010/main" val="0"/>
               </a:ext>
             </a:extLst>
           </a:blip>
@@ -12757,8 +11877,8 @@
         </p:blipFill>
         <p:spPr bwMode="auto">
           <a:xfrm>
-            <a:off x="705731" y="1450672"/>
-            <a:ext cx="7729362" cy="2269930"/>
+            <a:off x="640080" y="914400"/>
+            <a:ext cx="7863840" cy="3574474"/>
           </a:xfrm>
           <a:prstGeom prst="rect">
             <a:avLst/>
@@ -12773,53 +11893,6 @@
               </a14:hiddenFill>
             </a:ext>
           </a:extLst>
-        </p:spPr>
-      </p:pic>
-      <p:pic>
-        <p:nvPicPr>
-          <p:cNvPr id="4" name="Picture 2" descr="http://www.arvixe.com/images/landing_pages/iis8_hosting.png"/>
-          <p:cNvPicPr>
-            <a:picLocks noChangeAspect="1" noChangeArrowheads="1"/>
-          </p:cNvPicPr>
-          <p:nvPr/>
-        </p:nvPicPr>
-        <p:blipFill>
-          <a:blip r:embed="rId4">
-            <a:extLst>
-              <a:ext uri="{28A0092B-C50C-407E-A947-70E740481C1C}">
-                <a14:useLocalDpi xmlns:a14="http://schemas.microsoft.com/office/drawing/2010/main"/>
-              </a:ext>
-            </a:extLst>
-          </a:blip>
-          <a:srcRect/>
-          <a:stretch>
-            <a:fillRect/>
-          </a:stretch>
-        </p:blipFill>
-        <p:spPr bwMode="auto">
-          <a:xfrm>
-            <a:off x="1751012" y="1274793"/>
-            <a:ext cx="2819400" cy="2621687"/>
-          </a:xfrm>
-          <a:prstGeom prst="roundRect">
-            <a:avLst>
-              <a:gd name="adj" fmla="val 2122"/>
-            </a:avLst>
-          </a:prstGeom>
-          <a:solidFill>
-            <a:srgbClr val="FFFFFF"/>
-          </a:solidFill>
-          <a:ln>
-            <a:noFill/>
-          </a:ln>
-          <a:effectLst>
-            <a:outerShdw blurRad="63500" sx="102000" sy="102000" algn="ctr" rotWithShape="0">
-              <a:prstClr val="black">
-                <a:alpha val="40000"/>
-              </a:prstClr>
-            </a:outerShdw>
-          </a:effectLst>
-          <a:extLst/>
         </p:spPr>
       </p:pic>
     </p:spTree>
@@ -13164,8 +12237,8 @@
         </p:nvSpPr>
         <p:spPr>
           <a:xfrm>
-            <a:off x="228600" y="838200"/>
-            <a:ext cx="8686800" cy="5791200"/>
+            <a:off x="228600" y="685800"/>
+            <a:ext cx="8686800" cy="5943600"/>
           </a:xfrm>
         </p:spPr>
         <p:txBody>
@@ -13180,7 +12253,7 @@
                 <a:spcPts val="300"/>
               </a:spcBef>
               <a:spcAft>
-                <a:spcPts val="300"/>
+                <a:spcPts val="0"/>
               </a:spcAft>
             </a:pPr>
             <a:r>
@@ -13198,7 +12271,7 @@
                 <a:spcPts val="300"/>
               </a:spcBef>
               <a:spcAft>
-                <a:spcPts val="300"/>
+                <a:spcPts val="0"/>
               </a:spcAft>
             </a:pPr>
             <a:r>
@@ -13235,7 +12308,7 @@
                 <a:spcPts val="300"/>
               </a:spcBef>
               <a:spcAft>
-                <a:spcPts val="300"/>
+                <a:spcPts val="0"/>
               </a:spcAft>
             </a:pPr>
             <a:r>
@@ -13265,7 +12338,7 @@
                 <a:spcPts val="300"/>
               </a:spcBef>
               <a:spcAft>
-                <a:spcPts val="300"/>
+                <a:spcPts val="0"/>
               </a:spcAft>
             </a:pPr>
             <a:r>
@@ -13290,7 +12363,7 @@
                 <a:spcPts val="300"/>
               </a:spcBef>
               <a:spcAft>
-                <a:spcPts val="300"/>
+                <a:spcPts val="0"/>
               </a:spcAft>
             </a:pPr>
             <a:r>
@@ -13311,7 +12384,7 @@
                 <a:spcPts val="300"/>
               </a:spcBef>
               <a:spcAft>
-                <a:spcPts val="300"/>
+                <a:spcPts val="0"/>
               </a:spcAft>
             </a:pPr>
             <a:r>
@@ -13328,7 +12401,7 @@
                 <a:spcPts val="300"/>
               </a:spcBef>
               <a:spcAft>
-                <a:spcPts val="300"/>
+                <a:spcPts val="0"/>
               </a:spcAft>
             </a:pPr>
             <a:r>
@@ -13366,7 +12439,7 @@
                 <a:spcPts val="300"/>
               </a:spcBef>
               <a:spcAft>
-                <a:spcPts val="300"/>
+                <a:spcPts val="0"/>
               </a:spcAft>
             </a:pPr>
             <a:r>
@@ -13383,7 +12456,7 @@
                 <a:spcPts val="300"/>
               </a:spcBef>
               <a:spcAft>
-                <a:spcPts val="300"/>
+                <a:spcPts val="0"/>
               </a:spcAft>
             </a:pPr>
             <a:r>
@@ -13392,11 +12465,7 @@
             </a:r>
             <a:r>
               <a:rPr lang="en-US" sz="3400" dirty="0" smtClean="0"/>
-              <a:t>8 (Windows Server 2012</a:t>
-            </a:r>
-            <a:r>
-              <a:rPr lang="en-US" sz="3400" dirty="0" smtClean="0"/>
-              <a:t>)</a:t>
+              <a:t>8 (Windows Server 2012)</a:t>
             </a:r>
           </a:p>
           <a:p>
@@ -13408,12 +12477,29 @@
                 <a:spcPts val="300"/>
               </a:spcBef>
               <a:spcAft>
-                <a:spcPts val="300"/>
+                <a:spcPts val="0"/>
               </a:spcAft>
             </a:pPr>
             <a:r>
               <a:rPr lang="en-US" sz="3400" dirty="0" smtClean="0"/>
               <a:t>IIS 8.5 (Windows Server 2012 R2)</a:t>
+            </a:r>
+          </a:p>
+          <a:p>
+            <a:pPr>
+              <a:lnSpc>
+                <a:spcPct val="100000"/>
+              </a:lnSpc>
+              <a:spcBef>
+                <a:spcPts val="300"/>
+              </a:spcBef>
+              <a:spcAft>
+                <a:spcPts val="0"/>
+              </a:spcAft>
+            </a:pPr>
+            <a:r>
+              <a:rPr lang="en-US" sz="3400" dirty="0" smtClean="0"/>
+              <a:t>IIS 10 (Windows Server 2016, HTTP/2)</a:t>
             </a:r>
             <a:endParaRPr lang="bg-BG" sz="3400" dirty="0"/>
           </a:p>
@@ -13448,60 +12534,6 @@
           </a:p>
         </p:txBody>
       </p:sp>
-      <p:pic>
-        <p:nvPicPr>
-          <p:cNvPr id="6" name="Picture 2" descr="http://www.arvixe.com/images/landing_pages/iis8_hosting.png"/>
-          <p:cNvPicPr>
-            <a:picLocks noChangeAspect="1" noChangeArrowheads="1"/>
-          </p:cNvPicPr>
-          <p:nvPr/>
-        </p:nvPicPr>
-        <p:blipFill>
-          <a:blip r:embed="rId3" cstate="screen">
-            <a:extLst>
-              <a:ext uri="{28A0092B-C50C-407E-A947-70E740481C1C}">
-                <a14:useLocalDpi xmlns:a14="http://schemas.microsoft.com/office/drawing/2010/main"/>
-              </a:ext>
-            </a:extLst>
-          </a:blip>
-          <a:srcRect/>
-          <a:stretch>
-            <a:fillRect/>
-          </a:stretch>
-        </p:blipFill>
-        <p:spPr bwMode="auto">
-          <a:xfrm>
-            <a:off x="7436556" y="5235794"/>
-            <a:ext cx="1416756" cy="1317405"/>
-          </a:xfrm>
-          <a:prstGeom prst="rect">
-            <a:avLst/>
-          </a:prstGeom>
-          <a:ln w="38100" cap="sq">
-            <a:solidFill>
-              <a:srgbClr val="000000"/>
-            </a:solidFill>
-            <a:prstDash val="solid"/>
-            <a:miter lim="800000"/>
-          </a:ln>
-          <a:effectLst>
-            <a:outerShdw blurRad="50800" dist="38100" dir="2700000" algn="tl" rotWithShape="0">
-              <a:srgbClr val="000000">
-                <a:alpha val="43000"/>
-              </a:srgbClr>
-            </a:outerShdw>
-          </a:effectLst>
-          <a:extLst>
-            <a:ext uri="{909E8E84-426E-40DD-AFC4-6F175D3DCCD1}">
-              <a14:hiddenFill xmlns:a14="http://schemas.microsoft.com/office/drawing/2010/main">
-                <a:solidFill>
-                  <a:srgbClr val="FFFFFF"/>
-                </a:solidFill>
-              </a14:hiddenFill>
-            </a:ext>
-          </a:extLst>
-        </p:spPr>
-      </p:pic>
     </p:spTree>
     <p:extLst>
       <p:ext uri="{BB962C8B-B14F-4D97-AF65-F5344CB8AC3E}">
@@ -13590,11 +12622,7 @@
           <a:p>
             <a:r>
               <a:rPr lang="en-US" dirty="0" smtClean="0"/>
-              <a:t>Turn On / Off Windows </a:t>
-            </a:r>
-            <a:r>
-              <a:rPr lang="en-US" dirty="0" smtClean="0"/>
-              <a:t>Features,</a:t>
+              <a:t>Turn On / Off Windows Features,</a:t>
             </a:r>
             <a:br>
               <a:rPr lang="en-US" dirty="0" smtClean="0"/>

</xml_diff>